<commit_message>
Slides April 1st 00:24
</commit_message>
<xml_diff>
--- a/واقعیت مجازی ( Virtual Reality ).pptx
+++ b/واقعیت مجازی ( Virtual Reality ).pptx
@@ -5,7 +5,7 @@
     <p:sldMasterId id="2147483648" r:id="rId1"/>
   </p:sldMasterIdLst>
   <p:notesMasterIdLst>
-    <p:notesMasterId r:id="rId30"/>
+    <p:notesMasterId r:id="rId36"/>
   </p:notesMasterIdLst>
   <p:sldIdLst>
     <p:sldId id="256" r:id="rId2"/>
@@ -31,11 +31,17 @@
     <p:sldId id="281" r:id="rId22"/>
     <p:sldId id="283" r:id="rId23"/>
     <p:sldId id="279" r:id="rId24"/>
-    <p:sldId id="263" r:id="rId25"/>
-    <p:sldId id="264" r:id="rId26"/>
-    <p:sldId id="265" r:id="rId27"/>
-    <p:sldId id="266" r:id="rId28"/>
-    <p:sldId id="280" r:id="rId29"/>
+    <p:sldId id="284" r:id="rId25"/>
+    <p:sldId id="285" r:id="rId26"/>
+    <p:sldId id="286" r:id="rId27"/>
+    <p:sldId id="289" r:id="rId28"/>
+    <p:sldId id="288" r:id="rId29"/>
+    <p:sldId id="287" r:id="rId30"/>
+    <p:sldId id="263" r:id="rId31"/>
+    <p:sldId id="264" r:id="rId32"/>
+    <p:sldId id="265" r:id="rId33"/>
+    <p:sldId id="266" r:id="rId34"/>
+    <p:sldId id="280" r:id="rId35"/>
   </p:sldIdLst>
   <p:sldSz cx="9144000" cy="6858000" type="screen4x3"/>
   <p:notesSz cx="6858000" cy="9144000"/>
@@ -249,7 +255,7 @@
           <a:p>
             <a:fld id="{9077D2A7-0790-485D-A062-99A142C9CC43}" type="datetimeFigureOut">
               <a:rPr lang="fa-IR" smtClean="0"/>
-              <a:t>21/06/1437</a:t>
+              <a:t>22/06/1437</a:t>
             </a:fld>
             <a:endParaRPr lang="fa-IR"/>
           </a:p>
@@ -6327,7 +6333,6 @@
               <a:rPr lang="fa-IR" dirty="0" smtClean="0"/>
               <a:t>( مثال استفاده هیوندا از واقعیت افزوده به جای دفترچه راهنما . )</a:t>
             </a:r>
-            <a:endParaRPr lang="fa-IR" dirty="0" smtClean="0"/>
           </a:p>
           <a:p>
             <a:endParaRPr lang="fa-IR" dirty="0"/>
@@ -9145,15 +9150,7 @@
           <a:effectLst>
             <a:reflection blurRad="12700" stA="38000" endPos="28000" dist="5000" dir="5400000" sy="-100000" algn="bl" rotWithShape="0"/>
           </a:effectLst>
-          <a:extLst>
-            <a:ext uri="{909E8E84-426E-40DD-AFC4-6F175D3DCCD1}">
-              <a14:hiddenFill xmlns:a14="http://schemas.microsoft.com/office/drawing/2010/main">
-                <a:solidFill>
-                  <a:srgbClr val="FFFFFF"/>
-                </a:solidFill>
-              </a14:hiddenFill>
-            </a:ext>
-          </a:extLst>
+          <a:extLst/>
         </p:spPr>
       </p:pic>
       <p:pic>
@@ -9198,15 +9195,7 @@
           <a:effectLst>
             <a:reflection blurRad="12700" stA="38000" endPos="28000" dist="5000" dir="5400000" sy="-100000" algn="bl" rotWithShape="0"/>
           </a:effectLst>
-          <a:extLst>
-            <a:ext uri="{909E8E84-426E-40DD-AFC4-6F175D3DCCD1}">
-              <a14:hiddenFill xmlns:a14="http://schemas.microsoft.com/office/drawing/2010/main">
-                <a:solidFill>
-                  <a:srgbClr val="FFFFFF"/>
-                </a:solidFill>
-              </a14:hiddenFill>
-            </a:ext>
-          </a:extLst>
+          <a:extLst/>
         </p:spPr>
       </p:pic>
     </p:spTree>
@@ -9512,15 +9501,7 @@
           <a:effectLst>
             <a:reflection blurRad="12700" stA="38000" endPos="28000" dist="5000" dir="5400000" sy="-100000" algn="bl" rotWithShape="0"/>
           </a:effectLst>
-          <a:extLst>
-            <a:ext uri="{909E8E84-426E-40DD-AFC4-6F175D3DCCD1}">
-              <a14:hiddenFill xmlns:a14="http://schemas.microsoft.com/office/drawing/2010/main">
-                <a:solidFill>
-                  <a:srgbClr val="FFFFFF"/>
-                </a:solidFill>
-              </a14:hiddenFill>
-            </a:ext>
-          </a:extLst>
+          <a:extLst/>
         </p:spPr>
       </p:pic>
       <p:pic>
@@ -9565,15 +9546,7 @@
           <a:effectLst>
             <a:reflection blurRad="12700" stA="38000" endPos="28000" dist="5000" dir="5400000" sy="-100000" algn="bl" rotWithShape="0"/>
           </a:effectLst>
-          <a:extLst>
-            <a:ext uri="{909E8E84-426E-40DD-AFC4-6F175D3DCCD1}">
-              <a14:hiddenFill xmlns:a14="http://schemas.microsoft.com/office/drawing/2010/main">
-                <a:solidFill>
-                  <a:srgbClr val="FFFFFF"/>
-                </a:solidFill>
-              </a14:hiddenFill>
-            </a:ext>
-          </a:extLst>
+          <a:extLst/>
         </p:spPr>
       </p:pic>
     </p:spTree>
@@ -10799,11 +10772,7 @@
           <a:p>
             <a:r>
               <a:rPr lang="fa-IR" dirty="0" smtClean="0"/>
-              <a:t>فایده ها و </a:t>
-            </a:r>
-            <a:r>
-              <a:rPr lang="fa-IR" dirty="0" smtClean="0"/>
-              <a:t>مضررات </a:t>
+              <a:t>فایده ها و مضررات </a:t>
             </a:r>
             <a:endParaRPr lang="fa-IR" dirty="0"/>
           </a:p>
@@ -11370,7 +11339,7 @@
             <a:r>
               <a:rPr lang="fa-IR" dirty="0" smtClean="0">
                 <a:solidFill>
-                  <a:srgbClr val="CC0000"/>
+                  <a:srgbClr val="FF0000"/>
                 </a:solidFill>
               </a:rPr>
               <a:t>عزت نفس پایین </a:t>
@@ -11382,7 +11351,7 @@
             <a:r>
               <a:rPr lang="fa-IR" dirty="0">
                 <a:solidFill>
-                  <a:srgbClr val="CC0000"/>
+                  <a:srgbClr val="FF0000"/>
                 </a:solidFill>
               </a:rPr>
               <a:t>احساس بی ارزشی </a:t>
@@ -11398,7 +11367,7 @@
             <a:r>
               <a:rPr lang="fa-IR" dirty="0" smtClean="0">
                 <a:solidFill>
-                  <a:srgbClr val="CC0000"/>
+                  <a:srgbClr val="FF0000"/>
                 </a:solidFill>
               </a:rPr>
               <a:t>اعمال خود </a:t>
@@ -11406,7 +11375,7 @@
             <a:r>
               <a:rPr lang="fa-IR" dirty="0">
                 <a:solidFill>
-                  <a:srgbClr val="CC0000"/>
+                  <a:srgbClr val="FF0000"/>
                 </a:solidFill>
               </a:rPr>
               <a:t>مخرب </a:t>
@@ -11431,7 +11400,7 @@
             <a:r>
               <a:rPr lang="fa-IR" dirty="0" smtClean="0">
                 <a:solidFill>
-                  <a:srgbClr val="CC0000"/>
+                  <a:srgbClr val="FF0000"/>
                 </a:solidFill>
               </a:rPr>
               <a:t>حساسیت زدایی </a:t>
@@ -11599,7 +11568,141 @@
           <a:bodyPr/>
           <a:lstStyle/>
           <a:p>
-            <a:endParaRPr lang="fa-IR"/>
+            <a:r>
+              <a:rPr lang="fa-IR" dirty="0"/>
+              <a:t>مشکلات اخلاقی بیشتر از دو مورد زیر نشات </a:t>
+            </a:r>
+            <a:r>
+              <a:rPr lang="fa-IR" dirty="0" smtClean="0"/>
+              <a:t>می گیرد : </a:t>
+            </a:r>
+          </a:p>
+          <a:p>
+            <a:pPr lvl="1">
+              <a:buFont typeface="Wingdings" panose="05000000000000000000" pitchFamily="2" charset="2"/>
+              <a:buChar char="Ø"/>
+            </a:pPr>
+            <a:r>
+              <a:rPr lang="fa-IR" dirty="0" smtClean="0"/>
+              <a:t>نحوه </a:t>
+            </a:r>
+            <a:r>
+              <a:rPr lang="fa-IR" dirty="0"/>
+              <a:t>استفاده </a:t>
+            </a:r>
+            <a:r>
+              <a:rPr lang="fa-IR" dirty="0" smtClean="0"/>
+              <a:t>آنها</a:t>
+            </a:r>
+            <a:endParaRPr lang="en-US" dirty="0"/>
+          </a:p>
+          <a:p>
+            <a:pPr lvl="1">
+              <a:buFont typeface="Wingdings" panose="05000000000000000000" pitchFamily="2" charset="2"/>
+              <a:buChar char="Ø"/>
+            </a:pPr>
+            <a:r>
+              <a:rPr lang="fa-IR" dirty="0" smtClean="0"/>
+              <a:t>محیط </a:t>
+            </a:r>
+            <a:r>
+              <a:rPr lang="fa-IR" dirty="0"/>
+              <a:t>های اپلیکیشن های مورد استفاده </a:t>
+            </a:r>
+            <a:endParaRPr lang="en-US" dirty="0"/>
+          </a:p>
+          <a:p>
+            <a:endParaRPr lang="fa-IR" dirty="0" smtClean="0"/>
+          </a:p>
+          <a:p>
+            <a:endParaRPr lang="fa-IR" dirty="0"/>
+          </a:p>
+          <a:p>
+            <a:r>
+              <a:rPr lang="fa-IR" dirty="0" smtClean="0"/>
+              <a:t>اپلیکیشن </a:t>
+            </a:r>
+            <a:r>
+              <a:rPr lang="fa-IR" dirty="0"/>
+              <a:t>های </a:t>
+            </a:r>
+            <a:r>
+              <a:rPr lang="en-US" dirty="0">
+                <a:latin typeface="Comic Sans MS" panose="030F0702030302020204" pitchFamily="66" charset="0"/>
+              </a:rPr>
+              <a:t>VR</a:t>
+            </a:r>
+            <a:r>
+              <a:rPr lang="fa-IR" dirty="0"/>
+              <a:t> اجازه </a:t>
+            </a:r>
+            <a:r>
+              <a:rPr lang="fa-IR" dirty="0" smtClean="0"/>
+              <a:t>می دهد </a:t>
+            </a:r>
+            <a:r>
+              <a:rPr lang="fa-IR" dirty="0"/>
+              <a:t>که هر گونه عمل فاسدی از جمله </a:t>
+            </a:r>
+            <a:r>
+              <a:rPr lang="fa-IR" dirty="0" smtClean="0"/>
+              <a:t>قتل ، شکنجه</a:t>
+            </a:r>
+            <a:r>
+              <a:rPr lang="fa-IR" dirty="0"/>
+              <a:t> </a:t>
+            </a:r>
+            <a:r>
+              <a:rPr lang="fa-IR" dirty="0" smtClean="0"/>
+              <a:t>، </a:t>
+            </a:r>
+            <a:r>
+              <a:rPr lang="fa-IR" dirty="0"/>
+              <a:t>قطع </a:t>
+            </a:r>
+            <a:r>
+              <a:rPr lang="fa-IR" dirty="0" smtClean="0"/>
+              <a:t>عضو</a:t>
+            </a:r>
+            <a:r>
+              <a:rPr lang="fa-IR" dirty="0"/>
+              <a:t> </a:t>
+            </a:r>
+            <a:r>
+              <a:rPr lang="fa-IR" dirty="0" smtClean="0"/>
+              <a:t>، </a:t>
+            </a:r>
+            <a:r>
+              <a:rPr lang="fa-IR" dirty="0"/>
+              <a:t>دزدی را به نمایش </a:t>
+            </a:r>
+            <a:r>
+              <a:rPr lang="fa-IR" dirty="0" smtClean="0"/>
+              <a:t>بکشد . همچنین </a:t>
+            </a:r>
+            <a:r>
+              <a:rPr lang="fa-IR" dirty="0"/>
+              <a:t>دیگر امکانات این اپلیکیشن ها گذاشتن خود جای شخصیت ها و بازی کردن سناریوی آنها از جمله عملیات تروریستی و </a:t>
+            </a:r>
+            <a:r>
+              <a:rPr lang="fa-IR" dirty="0" smtClean="0"/>
+              <a:t>آمادگی </a:t>
+            </a:r>
+            <a:r>
+              <a:rPr lang="fa-IR" dirty="0"/>
+              <a:t>برای قتل های زنجیره </a:t>
+            </a:r>
+            <a:r>
+              <a:rPr lang="fa-IR" dirty="0" smtClean="0"/>
+              <a:t>ایست . </a:t>
+            </a:r>
+            <a:endParaRPr lang="en-US" dirty="0"/>
+          </a:p>
+          <a:p>
+            <a:endParaRPr lang="en-US" dirty="0"/>
+          </a:p>
+          <a:p>
+            <a:endParaRPr lang="fa-IR" dirty="0"/>
           </a:p>
         </p:txBody>
       </p:sp>
@@ -11709,12 +11812,12 @@
       </p:grpSpPr>
       <p:sp>
         <p:nvSpPr>
-          <p:cNvPr id="2" name="Title 1"/>
+          <p:cNvPr id="3" name="Content Placeholder 2"/>
           <p:cNvSpPr>
             <a:spLocks noGrp="1"/>
           </p:cNvSpPr>
           <p:nvPr>
-            <p:ph type="title"/>
+            <p:ph idx="1"/>
           </p:nvPr>
         </p:nvSpPr>
         <p:spPr/>
@@ -11723,85 +11826,64 @@
           <a:lstStyle/>
           <a:p>
             <a:r>
-              <a:rPr lang="fa-IR" dirty="0" smtClean="0"/>
-              <a:t>واقعیت مجازی در ایران</a:t>
-            </a:r>
-            <a:endParaRPr lang="fa-IR" dirty="0"/>
-          </a:p>
-        </p:txBody>
-      </p:sp>
-      <p:sp>
-        <p:nvSpPr>
-          <p:cNvPr id="3" name="Content Placeholder 2"/>
-          <p:cNvSpPr>
-            <a:spLocks noGrp="1"/>
-          </p:cNvSpPr>
-          <p:nvPr>
-            <p:ph idx="1"/>
-          </p:nvPr>
-        </p:nvSpPr>
-        <p:spPr>
-          <a:xfrm>
-            <a:off x="1547664" y="1412776"/>
-            <a:ext cx="7139136" cy="4713387"/>
-          </a:xfrm>
-        </p:spPr>
-        <p:txBody>
-          <a:bodyPr/>
-          <a:lstStyle/>
-          <a:p>
-            <a:r>
-              <a:rPr lang="fa-IR" dirty="0" smtClean="0">
-                <a:solidFill>
-                  <a:srgbClr val="00B0F0"/>
-                </a:solidFill>
-              </a:rPr>
-              <a:t>مؤسسه رسانه پرداز آمیتیس </a:t>
-            </a:r>
-            <a:r>
-              <a:rPr lang="fa-IR" dirty="0" smtClean="0"/>
-              <a:t>سازنده بازی رایانه‌ای « مبارزه در خلیج عدن » در تاریخ ۲۲ دی ماه سال ۱۳۹۳ برای اولین بار از دستاورد خود در حوزه واقعیت مجازی رونمایی کرد . تبدیل انواع هدست‌های نمایشگر سه بعدی ( </a:t>
-            </a:r>
-            <a:r>
-              <a:rPr lang="en-US" dirty="0" smtClean="0">
-                <a:latin typeface="Comic Sans MS" panose="030F0702030302020204" pitchFamily="66" charset="0"/>
-              </a:rPr>
-              <a:t>3D Viewer</a:t>
-            </a:r>
-            <a:r>
               <a:rPr lang="fa-IR" dirty="0"/>
-              <a:t> ) به هدست واقعیت مجازی ، توسعه و گسترش این تکنولوژی به منظور بهره‌برداری در شهربازی‌ها و مباحث شبیه‌ساز تنها بخشی از فعالیت‌های استودیو آمیتیس در این زمینه است . لازم است ذکر شود این محصول تحت عنوان </a:t>
-            </a:r>
-            <a:r>
-              <a:rPr lang="en-US" dirty="0" err="1">
-                <a:latin typeface="Comic Sans MS" panose="030F0702030302020204" pitchFamily="66" charset="0"/>
-              </a:rPr>
-              <a:t>Amytech</a:t>
-            </a:r>
-            <a:r>
-              <a:rPr lang="en-US" dirty="0">
-                <a:latin typeface="Comic Sans MS" panose="030F0702030302020204" pitchFamily="66" charset="0"/>
-              </a:rPr>
-              <a:t> </a:t>
-            </a:r>
-            <a:r>
-              <a:rPr lang="en-US" dirty="0" smtClean="0">
-                <a:latin typeface="Comic Sans MS" panose="030F0702030302020204" pitchFamily="66" charset="0"/>
-              </a:rPr>
-              <a:t>1</a:t>
-            </a:r>
-            <a:r>
-              <a:rPr lang="fa-IR" dirty="0" smtClean="0"/>
-              <a:t> اولین </a:t>
+              <a:t>این موارد اخلاقی را میتوان از دوجنبه بررسی </a:t>
+            </a:r>
+            <a:r>
+              <a:rPr lang="fa-IR" dirty="0" smtClean="0"/>
+              <a:t>نمود : </a:t>
+            </a:r>
+          </a:p>
+          <a:p>
+            <a:endParaRPr lang="en-US" dirty="0"/>
+          </a:p>
+          <a:p>
+            <a:pPr lvl="2">
+              <a:buFont typeface="Wingdings" panose="05000000000000000000" pitchFamily="2" charset="2"/>
+              <a:buChar char="Ø"/>
+            </a:pPr>
+            <a:r>
+              <a:rPr lang="fa-IR" dirty="0" smtClean="0"/>
+              <a:t>جنبه </a:t>
             </a:r>
             <a:r>
               <a:rPr lang="fa-IR" dirty="0"/>
-              <a:t>هدست واقعیت مجازی مبتنی بر کامپیوتر ایرانی در چهارمین دوره نمایشگاه شهر بازی و اوقات فراغت رونمایی </a:t>
-            </a:r>
-            <a:r>
-              <a:rPr lang="fa-IR" dirty="0" smtClean="0"/>
-              <a:t>گردید .</a:t>
-            </a:r>
+              <a:t>ی </a:t>
+            </a:r>
+            <a:r>
+              <a:rPr lang="fa-IR" dirty="0" smtClean="0"/>
+              <a:t>بازنمودی ( نمایشی )</a:t>
+            </a:r>
+            <a:endParaRPr lang="en-US" dirty="0"/>
+          </a:p>
+          <a:p>
+            <a:pPr lvl="2">
+              <a:buFont typeface="Wingdings" panose="05000000000000000000" pitchFamily="2" charset="2"/>
+              <a:buChar char="Ø"/>
+            </a:pPr>
+            <a:r>
+              <a:rPr lang="fa-IR" dirty="0" smtClean="0"/>
+              <a:t>جنبه </a:t>
+            </a:r>
+            <a:r>
+              <a:rPr lang="fa-IR" dirty="0"/>
+              <a:t>ی </a:t>
+            </a:r>
+            <a:r>
+              <a:rPr lang="fa-IR" dirty="0" smtClean="0"/>
+              <a:t>تعاملی</a:t>
+            </a:r>
+            <a:r>
+              <a:rPr lang="en-US" dirty="0" smtClean="0"/>
+              <a:t> ) </a:t>
+            </a:r>
+            <a:r>
+              <a:rPr lang="fa-IR" dirty="0" smtClean="0"/>
+              <a:t>اخلاقی )</a:t>
+            </a:r>
+            <a:endParaRPr lang="en-US" dirty="0"/>
+          </a:p>
+          <a:p>
             <a:endParaRPr lang="fa-IR" dirty="0"/>
           </a:p>
         </p:txBody>
@@ -11856,6 +11938,2239 @@
                 <a:defRPr/>
               </a:pPr>
               <a:t>24</a:t>
+            </a:fld>
+            <a:endParaRPr lang="es-ES" altLang="fa-IR" dirty="0"/>
+          </a:p>
+        </p:txBody>
+      </p:sp>
+    </p:spTree>
+    <p:extLst>
+      <p:ext uri="{BB962C8B-B14F-4D97-AF65-F5344CB8AC3E}">
+        <p14:creationId xmlns:p14="http://schemas.microsoft.com/office/powerpoint/2010/main" val="2756582654"/>
+      </p:ext>
+    </p:extLst>
+  </p:cSld>
+  <p:clrMapOvr>
+    <a:masterClrMapping/>
+  </p:clrMapOvr>
+  <mc:AlternateContent xmlns:mc="http://schemas.openxmlformats.org/markup-compatibility/2006" xmlns:p14="http://schemas.microsoft.com/office/powerpoint/2010/main">
+    <mc:Choice Requires="p14">
+      <p:transition spd="slow" p14:dur="800">
+        <p:diamond/>
+      </p:transition>
+    </mc:Choice>
+    <mc:Fallback xmlns="">
+      <p:transition spd="slow">
+        <p:diamond/>
+      </p:transition>
+    </mc:Fallback>
+  </mc:AlternateContent>
+  <p:timing>
+    <p:tnLst>
+      <p:par>
+        <p:cTn id="1" dur="indefinite" restart="never" nodeType="tmRoot"/>
+      </p:par>
+    </p:tnLst>
+  </p:timing>
+</p:sld>
+</file>
+
+<file path=ppt/slides/slide25.xml><?xml version="1.0" encoding="utf-8"?>
+<p:sld xmlns:a="http://schemas.openxmlformats.org/drawingml/2006/main" xmlns:r="http://schemas.openxmlformats.org/officeDocument/2006/relationships" xmlns:p="http://schemas.openxmlformats.org/presentationml/2006/main">
+  <p:cSld>
+    <p:spTree>
+      <p:nvGrpSpPr>
+        <p:cNvPr id="1" name=""/>
+        <p:cNvGrpSpPr/>
+        <p:nvPr/>
+      </p:nvGrpSpPr>
+      <p:grpSpPr>
+        <a:xfrm>
+          <a:off x="0" y="0"/>
+          <a:ext cx="0" cy="0"/>
+          <a:chOff x="0" y="0"/>
+          <a:chExt cx="0" cy="0"/>
+        </a:xfrm>
+      </p:grpSpPr>
+      <p:sp>
+        <p:nvSpPr>
+          <p:cNvPr id="2" name="Title 1"/>
+          <p:cNvSpPr>
+            <a:spLocks noGrp="1"/>
+          </p:cNvSpPr>
+          <p:nvPr>
+            <p:ph type="title"/>
+          </p:nvPr>
+        </p:nvSpPr>
+        <p:spPr/>
+        <p:txBody>
+          <a:bodyPr/>
+          <a:lstStyle/>
+          <a:p>
+            <a:r>
+              <a:rPr lang="fa-IR" dirty="0" smtClean="0"/>
+              <a:t>بازنمودی :</a:t>
+            </a:r>
+            <a:endParaRPr lang="fa-IR" dirty="0"/>
+          </a:p>
+        </p:txBody>
+      </p:sp>
+      <p:sp>
+        <p:nvSpPr>
+          <p:cNvPr id="3" name="Content Placeholder 2"/>
+          <p:cNvSpPr>
+            <a:spLocks noGrp="1"/>
+          </p:cNvSpPr>
+          <p:nvPr>
+            <p:ph idx="1"/>
+          </p:nvPr>
+        </p:nvSpPr>
+        <p:spPr/>
+        <p:txBody>
+          <a:bodyPr/>
+          <a:lstStyle/>
+          <a:p>
+            <a:r>
+              <a:rPr lang="fa-IR" dirty="0" smtClean="0"/>
+              <a:t>مشکل </a:t>
+            </a:r>
+            <a:r>
+              <a:rPr lang="fa-IR" dirty="0"/>
+              <a:t>اخلاقی که از نظر عرضه ی این اپ ها سرچشمه </a:t>
+            </a:r>
+            <a:r>
+              <a:rPr lang="fa-IR" dirty="0" smtClean="0"/>
+              <a:t>می گیرد </a:t>
+            </a:r>
+            <a:r>
+              <a:rPr lang="fa-IR" dirty="0"/>
+              <a:t>این </a:t>
+            </a:r>
+            <a:r>
+              <a:rPr lang="fa-IR" dirty="0" smtClean="0"/>
+              <a:t>است ؛ </a:t>
+            </a:r>
+            <a:r>
+              <a:rPr lang="fa-IR" dirty="0"/>
+              <a:t>که هر شی و هر مکان و </a:t>
+            </a:r>
+            <a:r>
+              <a:rPr lang="fa-IR" dirty="0" smtClean="0"/>
+              <a:t>فرد </a:t>
+            </a:r>
+            <a:r>
+              <a:rPr lang="fa-IR" dirty="0"/>
+              <a:t>و هر اتفاقی در نمایش </a:t>
+            </a:r>
+            <a:r>
+              <a:rPr lang="en-US" dirty="0">
+                <a:latin typeface="Comic Sans MS" panose="030F0702030302020204" pitchFamily="66" charset="0"/>
+              </a:rPr>
+              <a:t>VR</a:t>
+            </a:r>
+            <a:r>
+              <a:rPr lang="fa-IR" dirty="0"/>
+              <a:t> </a:t>
+            </a:r>
+            <a:r>
+              <a:rPr lang="fa-IR" dirty="0" smtClean="0"/>
+              <a:t>می تواند </a:t>
+            </a:r>
+            <a:r>
+              <a:rPr lang="fa-IR" dirty="0"/>
+              <a:t>مشکلات اخلاقی ایجاد </a:t>
+            </a:r>
+            <a:r>
+              <a:rPr lang="fa-IR" dirty="0" smtClean="0"/>
+              <a:t>کند !!! </a:t>
+            </a:r>
+          </a:p>
+          <a:p>
+            <a:endParaRPr lang="fa-IR" dirty="0"/>
+          </a:p>
+          <a:p>
+            <a:r>
+              <a:rPr lang="fa-IR" dirty="0"/>
+              <a:t>رابطه ی بین دنیای واقعیت مجازی </a:t>
+            </a:r>
+            <a:r>
+              <a:rPr lang="fa-IR" dirty="0" smtClean="0"/>
+              <a:t>و </a:t>
+            </a:r>
+            <a:r>
+              <a:rPr lang="fa-IR" dirty="0"/>
+              <a:t>دنیای واقعی </a:t>
+            </a:r>
+            <a:r>
+              <a:rPr lang="fa-IR" dirty="0" smtClean="0"/>
+              <a:t>می تواند </a:t>
+            </a:r>
+            <a:r>
+              <a:rPr lang="fa-IR" dirty="0"/>
+              <a:t>کاملا برعکس </a:t>
+            </a:r>
+            <a:r>
+              <a:rPr lang="fa-IR" dirty="0" smtClean="0"/>
+              <a:t>باشد ! </a:t>
+            </a:r>
+            <a:r>
+              <a:rPr lang="fa-IR" dirty="0"/>
+              <a:t>یا کاملا </a:t>
+            </a:r>
+            <a:r>
+              <a:rPr lang="fa-IR" dirty="0" smtClean="0"/>
+              <a:t>مشابه </a:t>
+            </a:r>
+            <a:r>
+              <a:rPr lang="fa-IR" dirty="0"/>
+              <a:t>دنیای واقعی و </a:t>
+            </a:r>
+            <a:r>
+              <a:rPr lang="fa-IR" dirty="0" smtClean="0"/>
+              <a:t>اتفاقاتی </a:t>
+            </a:r>
+            <a:r>
+              <a:rPr lang="fa-IR" dirty="0"/>
+              <a:t>که در آن </a:t>
+            </a:r>
+            <a:r>
+              <a:rPr lang="fa-IR" dirty="0" smtClean="0"/>
+              <a:t>می افتد </a:t>
+            </a:r>
+            <a:r>
+              <a:rPr lang="fa-IR" dirty="0"/>
+              <a:t>و یا کاملا </a:t>
+            </a:r>
+            <a:r>
+              <a:rPr lang="fa-IR" dirty="0" smtClean="0"/>
+              <a:t>تخیلی </a:t>
+            </a:r>
+            <a:r>
+              <a:rPr lang="fa-IR" dirty="0"/>
+              <a:t>و زاده ی </a:t>
+            </a:r>
+            <a:r>
+              <a:rPr lang="fa-IR" dirty="0" smtClean="0"/>
+              <a:t>ذهن . </a:t>
+            </a:r>
+          </a:p>
+          <a:p>
+            <a:endParaRPr lang="fa-IR" dirty="0"/>
+          </a:p>
+          <a:p>
+            <a:r>
+              <a:rPr lang="fa-IR" dirty="0"/>
+              <a:t>حال چرا ممکن است که موارد اخلاقی ایجاد </a:t>
+            </a:r>
+            <a:r>
+              <a:rPr lang="fa-IR" dirty="0" smtClean="0"/>
+              <a:t>شود ؟؟ </a:t>
+            </a:r>
+            <a:r>
+              <a:rPr lang="fa-IR" dirty="0"/>
+              <a:t>اپلیکیشن های </a:t>
+            </a:r>
+            <a:r>
+              <a:rPr lang="en-US" dirty="0">
+                <a:latin typeface="Comic Sans MS" panose="030F0702030302020204" pitchFamily="66" charset="0"/>
+              </a:rPr>
+              <a:t>VR</a:t>
+            </a:r>
+            <a:r>
+              <a:rPr lang="fa-IR" dirty="0"/>
+              <a:t> ممکن است برای هدفی که تعبیه شده اند به میزان کافی دقیق </a:t>
+            </a:r>
+            <a:r>
+              <a:rPr lang="fa-IR" dirty="0" smtClean="0"/>
+              <a:t>نباشند !  . . .</a:t>
+            </a:r>
+            <a:endParaRPr lang="en-US" dirty="0"/>
+          </a:p>
+          <a:p>
+            <a:endParaRPr lang="fa-IR" dirty="0" smtClean="0"/>
+          </a:p>
+        </p:txBody>
+      </p:sp>
+      <p:sp>
+        <p:nvSpPr>
+          <p:cNvPr id="4" name="Footer Placeholder 3"/>
+          <p:cNvSpPr>
+            <a:spLocks noGrp="1"/>
+          </p:cNvSpPr>
+          <p:nvPr>
+            <p:ph type="ftr" sz="quarter" idx="11"/>
+          </p:nvPr>
+        </p:nvSpPr>
+        <p:spPr/>
+        <p:txBody>
+          <a:bodyPr/>
+          <a:lstStyle/>
+          <a:p>
+            <a:pPr>
+              <a:defRPr/>
+            </a:pPr>
+            <a:r>
+              <a:rPr lang="fa-IR" altLang="fa-IR" smtClean="0"/>
+              <a:t>دانشگاه صنعتی اصفهان – دانشکده کامپیوتر</a:t>
+            </a:r>
+            <a:endParaRPr lang="es-ES" altLang="fa-IR" dirty="0"/>
+          </a:p>
+        </p:txBody>
+      </p:sp>
+      <p:sp>
+        <p:nvSpPr>
+          <p:cNvPr id="5" name="Slide Number Placeholder 4"/>
+          <p:cNvSpPr>
+            <a:spLocks noGrp="1"/>
+          </p:cNvSpPr>
+          <p:nvPr>
+            <p:ph type="sldNum" sz="quarter" idx="12"/>
+          </p:nvPr>
+        </p:nvSpPr>
+        <p:spPr/>
+        <p:txBody>
+          <a:bodyPr/>
+          <a:lstStyle/>
+          <a:p>
+            <a:pPr>
+              <a:defRPr/>
+            </a:pPr>
+            <a:fld id="{C5303A1E-C0C3-4A75-A42D-959ACBF920C8}" type="slidenum">
+              <a:rPr lang="es-ES" altLang="fa-IR" smtClean="0"/>
+              <a:pPr>
+                <a:defRPr/>
+              </a:pPr>
+              <a:t>25</a:t>
+            </a:fld>
+            <a:endParaRPr lang="es-ES" altLang="fa-IR" dirty="0"/>
+          </a:p>
+        </p:txBody>
+      </p:sp>
+    </p:spTree>
+    <p:extLst>
+      <p:ext uri="{BB962C8B-B14F-4D97-AF65-F5344CB8AC3E}">
+        <p14:creationId xmlns:p14="http://schemas.microsoft.com/office/powerpoint/2010/main" val="2728720948"/>
+      </p:ext>
+    </p:extLst>
+  </p:cSld>
+  <p:clrMapOvr>
+    <a:masterClrMapping/>
+  </p:clrMapOvr>
+  <mc:AlternateContent xmlns:mc="http://schemas.openxmlformats.org/markup-compatibility/2006" xmlns:p14="http://schemas.microsoft.com/office/powerpoint/2010/main">
+    <mc:Choice Requires="p14">
+      <p:transition spd="slow" p14:dur="800">
+        <p:diamond/>
+      </p:transition>
+    </mc:Choice>
+    <mc:Fallback xmlns="">
+      <p:transition spd="slow">
+        <p:diamond/>
+      </p:transition>
+    </mc:Fallback>
+  </mc:AlternateContent>
+  <p:timing>
+    <p:tnLst>
+      <p:par>
+        <p:cTn id="1" dur="indefinite" restart="never" nodeType="tmRoot"/>
+      </p:par>
+    </p:tnLst>
+  </p:timing>
+</p:sld>
+</file>
+
+<file path=ppt/slides/slide26.xml><?xml version="1.0" encoding="utf-8"?>
+<p:sld xmlns:a="http://schemas.openxmlformats.org/drawingml/2006/main" xmlns:r="http://schemas.openxmlformats.org/officeDocument/2006/relationships" xmlns:p="http://schemas.openxmlformats.org/presentationml/2006/main">
+  <p:cSld>
+    <p:spTree>
+      <p:nvGrpSpPr>
+        <p:cNvPr id="1" name=""/>
+        <p:cNvGrpSpPr/>
+        <p:nvPr/>
+      </p:nvGrpSpPr>
+      <p:grpSpPr>
+        <a:xfrm>
+          <a:off x="0" y="0"/>
+          <a:ext cx="0" cy="0"/>
+          <a:chOff x="0" y="0"/>
+          <a:chExt cx="0" cy="0"/>
+        </a:xfrm>
+      </p:grpSpPr>
+      <p:sp>
+        <p:nvSpPr>
+          <p:cNvPr id="2" name="Title 1"/>
+          <p:cNvSpPr>
+            <a:spLocks noGrp="1"/>
+          </p:cNvSpPr>
+          <p:nvPr>
+            <p:ph type="title"/>
+          </p:nvPr>
+        </p:nvSpPr>
+        <p:spPr/>
+        <p:txBody>
+          <a:bodyPr/>
+          <a:lstStyle/>
+          <a:p>
+            <a:r>
+              <a:rPr lang="fa-IR" dirty="0" smtClean="0"/>
+              <a:t>...</a:t>
+            </a:r>
+            <a:endParaRPr lang="fa-IR" dirty="0"/>
+          </a:p>
+        </p:txBody>
+      </p:sp>
+      <p:sp>
+        <p:nvSpPr>
+          <p:cNvPr id="3" name="Content Placeholder 2"/>
+          <p:cNvSpPr>
+            <a:spLocks noGrp="1"/>
+          </p:cNvSpPr>
+          <p:nvPr>
+            <p:ph idx="1"/>
+          </p:nvPr>
+        </p:nvSpPr>
+        <p:spPr/>
+        <p:txBody>
+          <a:bodyPr/>
+          <a:lstStyle/>
+          <a:p>
+            <a:r>
+              <a:rPr lang="fa-IR" dirty="0"/>
+              <a:t>این دقت باید </a:t>
+            </a:r>
+            <a:r>
+              <a:rPr lang="fa-IR" dirty="0" smtClean="0"/>
+              <a:t>فاکتور </a:t>
+            </a:r>
+            <a:r>
+              <a:rPr lang="fa-IR" dirty="0"/>
+              <a:t>های زیر را در برنامه های </a:t>
+            </a:r>
+            <a:r>
+              <a:rPr lang="en-US" dirty="0">
+                <a:latin typeface="Comic Sans MS" panose="030F0702030302020204" pitchFamily="66" charset="0"/>
+              </a:rPr>
+              <a:t>VR</a:t>
+            </a:r>
+            <a:r>
+              <a:rPr lang="fa-IR" dirty="0"/>
+              <a:t> دارا </a:t>
+            </a:r>
+            <a:r>
+              <a:rPr lang="fa-IR" dirty="0" smtClean="0"/>
+              <a:t>باشد :</a:t>
+            </a:r>
+          </a:p>
+          <a:p>
+            <a:endParaRPr lang="fa-IR" dirty="0"/>
+          </a:p>
+          <a:p>
+            <a:pPr lvl="1"/>
+            <a:r>
+              <a:rPr lang="fa-IR" dirty="0" smtClean="0"/>
+              <a:t>شمول </a:t>
+            </a:r>
+            <a:r>
+              <a:rPr lang="fa-IR" dirty="0"/>
+              <a:t>یا عدم شمول اشیای دنیای واقعی در این شبیه ساز با توجه به هدف تعبیه </a:t>
+            </a:r>
+            <a:r>
+              <a:rPr lang="fa-IR" dirty="0" smtClean="0"/>
+              <a:t>آن</a:t>
+            </a:r>
+          </a:p>
+          <a:p>
+            <a:pPr lvl="1"/>
+            <a:endParaRPr lang="fa-IR" dirty="0"/>
+          </a:p>
+          <a:p>
+            <a:pPr lvl="1"/>
+            <a:r>
+              <a:rPr lang="fa-IR" dirty="0" smtClean="0"/>
+              <a:t>میزان </a:t>
+            </a:r>
+            <a:r>
+              <a:rPr lang="fa-IR" dirty="0"/>
+              <a:t>واقعی نشان دادن جزییات و ویژگی ها با توجه به هدف تعبیه آن </a:t>
+            </a:r>
+            <a:endParaRPr lang="fa-IR" dirty="0"/>
+          </a:p>
+          <a:p>
+            <a:pPr lvl="1"/>
+            <a:endParaRPr lang="fa-IR" dirty="0" smtClean="0"/>
+          </a:p>
+          <a:p>
+            <a:pPr lvl="1"/>
+            <a:r>
+              <a:rPr lang="fa-IR" dirty="0" smtClean="0"/>
+              <a:t>میزان </a:t>
+            </a:r>
+            <a:r>
+              <a:rPr lang="fa-IR" dirty="0"/>
+              <a:t>استفاده ی کلیشه ای از افراد و اشیا در عرضه این </a:t>
+            </a:r>
+            <a:r>
+              <a:rPr lang="fa-IR" dirty="0" smtClean="0"/>
+              <a:t>محصولات</a:t>
+            </a:r>
+          </a:p>
+          <a:p>
+            <a:pPr lvl="1"/>
+            <a:endParaRPr lang="fa-IR" dirty="0"/>
+          </a:p>
+          <a:p>
+            <a:pPr lvl="1"/>
+            <a:r>
+              <a:rPr lang="fa-IR" dirty="0" smtClean="0"/>
+              <a:t>روابط </a:t>
+            </a:r>
+            <a:r>
+              <a:rPr lang="fa-IR" dirty="0"/>
+              <a:t>علت اتفاق و اثر آن </a:t>
+            </a:r>
+            <a:r>
+              <a:rPr lang="fa-IR" dirty="0" smtClean="0"/>
+              <a:t>اتفاق</a:t>
+            </a:r>
+          </a:p>
+        </p:txBody>
+      </p:sp>
+      <p:sp>
+        <p:nvSpPr>
+          <p:cNvPr id="4" name="Footer Placeholder 3"/>
+          <p:cNvSpPr>
+            <a:spLocks noGrp="1"/>
+          </p:cNvSpPr>
+          <p:nvPr>
+            <p:ph type="ftr" sz="quarter" idx="11"/>
+          </p:nvPr>
+        </p:nvSpPr>
+        <p:spPr/>
+        <p:txBody>
+          <a:bodyPr/>
+          <a:lstStyle/>
+          <a:p>
+            <a:pPr>
+              <a:defRPr/>
+            </a:pPr>
+            <a:r>
+              <a:rPr lang="fa-IR" altLang="fa-IR" smtClean="0"/>
+              <a:t>دانشگاه صنعتی اصفهان – دانشکده کامپیوتر</a:t>
+            </a:r>
+            <a:endParaRPr lang="es-ES" altLang="fa-IR" dirty="0"/>
+          </a:p>
+        </p:txBody>
+      </p:sp>
+      <p:sp>
+        <p:nvSpPr>
+          <p:cNvPr id="5" name="Slide Number Placeholder 4"/>
+          <p:cNvSpPr>
+            <a:spLocks noGrp="1"/>
+          </p:cNvSpPr>
+          <p:nvPr>
+            <p:ph type="sldNum" sz="quarter" idx="12"/>
+          </p:nvPr>
+        </p:nvSpPr>
+        <p:spPr/>
+        <p:txBody>
+          <a:bodyPr/>
+          <a:lstStyle/>
+          <a:p>
+            <a:pPr>
+              <a:defRPr/>
+            </a:pPr>
+            <a:fld id="{C5303A1E-C0C3-4A75-A42D-959ACBF920C8}" type="slidenum">
+              <a:rPr lang="es-ES" altLang="fa-IR" smtClean="0"/>
+              <a:pPr>
+                <a:defRPr/>
+              </a:pPr>
+              <a:t>26</a:t>
+            </a:fld>
+            <a:endParaRPr lang="es-ES" altLang="fa-IR" dirty="0"/>
+          </a:p>
+        </p:txBody>
+      </p:sp>
+    </p:spTree>
+    <p:extLst>
+      <p:ext uri="{BB962C8B-B14F-4D97-AF65-F5344CB8AC3E}">
+        <p14:creationId xmlns:p14="http://schemas.microsoft.com/office/powerpoint/2010/main" val="3841314995"/>
+      </p:ext>
+    </p:extLst>
+  </p:cSld>
+  <p:clrMapOvr>
+    <a:masterClrMapping/>
+  </p:clrMapOvr>
+  <mc:AlternateContent xmlns:mc="http://schemas.openxmlformats.org/markup-compatibility/2006" xmlns:p14="http://schemas.microsoft.com/office/powerpoint/2010/main">
+    <mc:Choice Requires="p14">
+      <p:transition spd="slow" p14:dur="800">
+        <p:diamond/>
+      </p:transition>
+    </mc:Choice>
+    <mc:Fallback xmlns="">
+      <p:transition spd="slow">
+        <p:diamond/>
+      </p:transition>
+    </mc:Fallback>
+  </mc:AlternateContent>
+  <p:timing>
+    <p:tnLst>
+      <p:par>
+        <p:cTn id="1" dur="indefinite" restart="never" nodeType="tmRoot">
+          <p:childTnLst>
+            <p:seq concurrent="1" nextAc="seek">
+              <p:cTn id="2" dur="indefinite" nodeType="mainSeq">
+                <p:childTnLst>
+                  <p:par>
+                    <p:cTn id="3" fill="hold">
+                      <p:stCondLst>
+                        <p:cond delay="indefinite"/>
+                      </p:stCondLst>
+                      <p:childTnLst>
+                        <p:par>
+                          <p:cTn id="4" fill="hold">
+                            <p:stCondLst>
+                              <p:cond delay="0"/>
+                            </p:stCondLst>
+                            <p:childTnLst>
+                              <p:par>
+                                <p:cTn id="5" presetID="27" presetClass="emph" presetSubtype="0" fill="remove" nodeType="clickEffect">
+                                  <p:stCondLst>
+                                    <p:cond delay="0"/>
+                                  </p:stCondLst>
+                                  <p:childTnLst>
+                                    <p:animClr clrSpc="rgb" dir="cw">
+                                      <p:cBhvr override="childStyle">
+                                        <p:cTn id="6" dur="1000" autoRev="1" fill="remove"/>
+                                        <p:tgtEl>
+                                          <p:spTgt spid="3">
+                                            <p:txEl>
+                                              <p:pRg st="2" end="2"/>
+                                            </p:txEl>
+                                          </p:spTgt>
+                                        </p:tgtEl>
+                                        <p:attrNameLst>
+                                          <p:attrName>style.color</p:attrName>
+                                        </p:attrNameLst>
+                                      </p:cBhvr>
+                                      <p:to>
+                                        <a:srgbClr val="FFC000"/>
+                                      </p:to>
+                                    </p:animClr>
+                                    <p:animClr clrSpc="rgb" dir="cw">
+                                      <p:cBhvr>
+                                        <p:cTn id="7" dur="1000" autoRev="1" fill="remove"/>
+                                        <p:tgtEl>
+                                          <p:spTgt spid="3">
+                                            <p:txEl>
+                                              <p:pRg st="2" end="2"/>
+                                            </p:txEl>
+                                          </p:spTgt>
+                                        </p:tgtEl>
+                                        <p:attrNameLst>
+                                          <p:attrName>fillcolor</p:attrName>
+                                        </p:attrNameLst>
+                                      </p:cBhvr>
+                                      <p:to>
+                                        <a:srgbClr val="FFC000"/>
+                                      </p:to>
+                                    </p:animClr>
+                                    <p:set>
+                                      <p:cBhvr>
+                                        <p:cTn id="8" dur="1000" autoRev="1" fill="remove"/>
+                                        <p:tgtEl>
+                                          <p:spTgt spid="3">
+                                            <p:txEl>
+                                              <p:pRg st="2" end="2"/>
+                                            </p:txEl>
+                                          </p:spTgt>
+                                        </p:tgtEl>
+                                        <p:attrNameLst>
+                                          <p:attrName>fill.type</p:attrName>
+                                        </p:attrNameLst>
+                                      </p:cBhvr>
+                                      <p:to>
+                                        <p:strVal val="solid"/>
+                                      </p:to>
+                                    </p:set>
+                                    <p:set>
+                                      <p:cBhvr>
+                                        <p:cTn id="9" dur="1000" autoRev="1" fill="remove"/>
+                                        <p:tgtEl>
+                                          <p:spTgt spid="3">
+                                            <p:txEl>
+                                              <p:pRg st="2" end="2"/>
+                                            </p:txEl>
+                                          </p:spTgt>
+                                        </p:tgtEl>
+                                        <p:attrNameLst>
+                                          <p:attrName>fill.on</p:attrName>
+                                        </p:attrNameLst>
+                                      </p:cBhvr>
+                                      <p:to>
+                                        <p:strVal val="true"/>
+                                      </p:to>
+                                    </p:set>
+                                  </p:childTnLst>
+                                </p:cTn>
+                              </p:par>
+                            </p:childTnLst>
+                          </p:cTn>
+                        </p:par>
+                      </p:childTnLst>
+                    </p:cTn>
+                  </p:par>
+                  <p:par>
+                    <p:cTn id="10" fill="hold">
+                      <p:stCondLst>
+                        <p:cond delay="indefinite"/>
+                      </p:stCondLst>
+                      <p:childTnLst>
+                        <p:par>
+                          <p:cTn id="11" fill="hold">
+                            <p:stCondLst>
+                              <p:cond delay="0"/>
+                            </p:stCondLst>
+                            <p:childTnLst>
+                              <p:par>
+                                <p:cTn id="12" presetID="27" presetClass="emph" presetSubtype="0" fill="remove" nodeType="clickEffect">
+                                  <p:stCondLst>
+                                    <p:cond delay="0"/>
+                                  </p:stCondLst>
+                                  <p:childTnLst>
+                                    <p:animClr clrSpc="rgb" dir="cw">
+                                      <p:cBhvr override="childStyle">
+                                        <p:cTn id="13" dur="1000" autoRev="1" fill="remove"/>
+                                        <p:tgtEl>
+                                          <p:spTgt spid="3">
+                                            <p:txEl>
+                                              <p:pRg st="4" end="4"/>
+                                            </p:txEl>
+                                          </p:spTgt>
+                                        </p:tgtEl>
+                                        <p:attrNameLst>
+                                          <p:attrName>style.color</p:attrName>
+                                        </p:attrNameLst>
+                                      </p:cBhvr>
+                                      <p:to>
+                                        <a:srgbClr val="FFC000"/>
+                                      </p:to>
+                                    </p:animClr>
+                                    <p:animClr clrSpc="rgb" dir="cw">
+                                      <p:cBhvr>
+                                        <p:cTn id="14" dur="1000" autoRev="1" fill="remove"/>
+                                        <p:tgtEl>
+                                          <p:spTgt spid="3">
+                                            <p:txEl>
+                                              <p:pRg st="4" end="4"/>
+                                            </p:txEl>
+                                          </p:spTgt>
+                                        </p:tgtEl>
+                                        <p:attrNameLst>
+                                          <p:attrName>fillcolor</p:attrName>
+                                        </p:attrNameLst>
+                                      </p:cBhvr>
+                                      <p:to>
+                                        <a:srgbClr val="FFC000"/>
+                                      </p:to>
+                                    </p:animClr>
+                                    <p:set>
+                                      <p:cBhvr>
+                                        <p:cTn id="15" dur="1000" autoRev="1" fill="remove"/>
+                                        <p:tgtEl>
+                                          <p:spTgt spid="3">
+                                            <p:txEl>
+                                              <p:pRg st="4" end="4"/>
+                                            </p:txEl>
+                                          </p:spTgt>
+                                        </p:tgtEl>
+                                        <p:attrNameLst>
+                                          <p:attrName>fill.type</p:attrName>
+                                        </p:attrNameLst>
+                                      </p:cBhvr>
+                                      <p:to>
+                                        <p:strVal val="solid"/>
+                                      </p:to>
+                                    </p:set>
+                                    <p:set>
+                                      <p:cBhvr>
+                                        <p:cTn id="16" dur="1000" autoRev="1" fill="remove"/>
+                                        <p:tgtEl>
+                                          <p:spTgt spid="3">
+                                            <p:txEl>
+                                              <p:pRg st="4" end="4"/>
+                                            </p:txEl>
+                                          </p:spTgt>
+                                        </p:tgtEl>
+                                        <p:attrNameLst>
+                                          <p:attrName>fill.on</p:attrName>
+                                        </p:attrNameLst>
+                                      </p:cBhvr>
+                                      <p:to>
+                                        <p:strVal val="true"/>
+                                      </p:to>
+                                    </p:set>
+                                  </p:childTnLst>
+                                </p:cTn>
+                              </p:par>
+                            </p:childTnLst>
+                          </p:cTn>
+                        </p:par>
+                      </p:childTnLst>
+                    </p:cTn>
+                  </p:par>
+                  <p:par>
+                    <p:cTn id="17" fill="hold">
+                      <p:stCondLst>
+                        <p:cond delay="indefinite"/>
+                      </p:stCondLst>
+                      <p:childTnLst>
+                        <p:par>
+                          <p:cTn id="18" fill="hold">
+                            <p:stCondLst>
+                              <p:cond delay="0"/>
+                            </p:stCondLst>
+                            <p:childTnLst>
+                              <p:par>
+                                <p:cTn id="19" presetID="27" presetClass="emph" presetSubtype="0" fill="remove" nodeType="clickEffect">
+                                  <p:stCondLst>
+                                    <p:cond delay="0"/>
+                                  </p:stCondLst>
+                                  <p:childTnLst>
+                                    <p:animClr clrSpc="rgb" dir="cw">
+                                      <p:cBhvr override="childStyle">
+                                        <p:cTn id="20" dur="1000" autoRev="1" fill="remove"/>
+                                        <p:tgtEl>
+                                          <p:spTgt spid="3">
+                                            <p:txEl>
+                                              <p:pRg st="6" end="6"/>
+                                            </p:txEl>
+                                          </p:spTgt>
+                                        </p:tgtEl>
+                                        <p:attrNameLst>
+                                          <p:attrName>style.color</p:attrName>
+                                        </p:attrNameLst>
+                                      </p:cBhvr>
+                                      <p:to>
+                                        <a:srgbClr val="FFC000"/>
+                                      </p:to>
+                                    </p:animClr>
+                                    <p:animClr clrSpc="rgb" dir="cw">
+                                      <p:cBhvr>
+                                        <p:cTn id="21" dur="1000" autoRev="1" fill="remove"/>
+                                        <p:tgtEl>
+                                          <p:spTgt spid="3">
+                                            <p:txEl>
+                                              <p:pRg st="6" end="6"/>
+                                            </p:txEl>
+                                          </p:spTgt>
+                                        </p:tgtEl>
+                                        <p:attrNameLst>
+                                          <p:attrName>fillcolor</p:attrName>
+                                        </p:attrNameLst>
+                                      </p:cBhvr>
+                                      <p:to>
+                                        <a:srgbClr val="FFC000"/>
+                                      </p:to>
+                                    </p:animClr>
+                                    <p:set>
+                                      <p:cBhvr>
+                                        <p:cTn id="22" dur="1000" autoRev="1" fill="remove"/>
+                                        <p:tgtEl>
+                                          <p:spTgt spid="3">
+                                            <p:txEl>
+                                              <p:pRg st="6" end="6"/>
+                                            </p:txEl>
+                                          </p:spTgt>
+                                        </p:tgtEl>
+                                        <p:attrNameLst>
+                                          <p:attrName>fill.type</p:attrName>
+                                        </p:attrNameLst>
+                                      </p:cBhvr>
+                                      <p:to>
+                                        <p:strVal val="solid"/>
+                                      </p:to>
+                                    </p:set>
+                                    <p:set>
+                                      <p:cBhvr>
+                                        <p:cTn id="23" dur="1000" autoRev="1" fill="remove"/>
+                                        <p:tgtEl>
+                                          <p:spTgt spid="3">
+                                            <p:txEl>
+                                              <p:pRg st="6" end="6"/>
+                                            </p:txEl>
+                                          </p:spTgt>
+                                        </p:tgtEl>
+                                        <p:attrNameLst>
+                                          <p:attrName>fill.on</p:attrName>
+                                        </p:attrNameLst>
+                                      </p:cBhvr>
+                                      <p:to>
+                                        <p:strVal val="true"/>
+                                      </p:to>
+                                    </p:set>
+                                  </p:childTnLst>
+                                </p:cTn>
+                              </p:par>
+                            </p:childTnLst>
+                          </p:cTn>
+                        </p:par>
+                      </p:childTnLst>
+                    </p:cTn>
+                  </p:par>
+                  <p:par>
+                    <p:cTn id="24" fill="hold">
+                      <p:stCondLst>
+                        <p:cond delay="indefinite"/>
+                      </p:stCondLst>
+                      <p:childTnLst>
+                        <p:par>
+                          <p:cTn id="25" fill="hold">
+                            <p:stCondLst>
+                              <p:cond delay="0"/>
+                            </p:stCondLst>
+                            <p:childTnLst>
+                              <p:par>
+                                <p:cTn id="26" presetID="27" presetClass="emph" presetSubtype="0" fill="remove" nodeType="clickEffect">
+                                  <p:stCondLst>
+                                    <p:cond delay="0"/>
+                                  </p:stCondLst>
+                                  <p:childTnLst>
+                                    <p:animClr clrSpc="rgb" dir="cw">
+                                      <p:cBhvr override="childStyle">
+                                        <p:cTn id="27" dur="1000" autoRev="1" fill="remove"/>
+                                        <p:tgtEl>
+                                          <p:spTgt spid="3">
+                                            <p:txEl>
+                                              <p:pRg st="8" end="8"/>
+                                            </p:txEl>
+                                          </p:spTgt>
+                                        </p:tgtEl>
+                                        <p:attrNameLst>
+                                          <p:attrName>style.color</p:attrName>
+                                        </p:attrNameLst>
+                                      </p:cBhvr>
+                                      <p:to>
+                                        <a:srgbClr val="FFC000"/>
+                                      </p:to>
+                                    </p:animClr>
+                                    <p:animClr clrSpc="rgb" dir="cw">
+                                      <p:cBhvr>
+                                        <p:cTn id="28" dur="1000" autoRev="1" fill="remove"/>
+                                        <p:tgtEl>
+                                          <p:spTgt spid="3">
+                                            <p:txEl>
+                                              <p:pRg st="8" end="8"/>
+                                            </p:txEl>
+                                          </p:spTgt>
+                                        </p:tgtEl>
+                                        <p:attrNameLst>
+                                          <p:attrName>fillcolor</p:attrName>
+                                        </p:attrNameLst>
+                                      </p:cBhvr>
+                                      <p:to>
+                                        <a:srgbClr val="FFC000"/>
+                                      </p:to>
+                                    </p:animClr>
+                                    <p:set>
+                                      <p:cBhvr>
+                                        <p:cTn id="29" dur="1000" autoRev="1" fill="remove"/>
+                                        <p:tgtEl>
+                                          <p:spTgt spid="3">
+                                            <p:txEl>
+                                              <p:pRg st="8" end="8"/>
+                                            </p:txEl>
+                                          </p:spTgt>
+                                        </p:tgtEl>
+                                        <p:attrNameLst>
+                                          <p:attrName>fill.type</p:attrName>
+                                        </p:attrNameLst>
+                                      </p:cBhvr>
+                                      <p:to>
+                                        <p:strVal val="solid"/>
+                                      </p:to>
+                                    </p:set>
+                                    <p:set>
+                                      <p:cBhvr>
+                                        <p:cTn id="30" dur="1000" autoRev="1" fill="remove"/>
+                                        <p:tgtEl>
+                                          <p:spTgt spid="3">
+                                            <p:txEl>
+                                              <p:pRg st="8" end="8"/>
+                                            </p:txEl>
+                                          </p:spTgt>
+                                        </p:tgtEl>
+                                        <p:attrNameLst>
+                                          <p:attrName>fill.on</p:attrName>
+                                        </p:attrNameLst>
+                                      </p:cBhvr>
+                                      <p:to>
+                                        <p:strVal val="true"/>
+                                      </p:to>
+                                    </p:set>
+                                  </p:childTnLst>
+                                </p:cTn>
+                              </p:par>
+                            </p:childTnLst>
+                          </p:cTn>
+                        </p:par>
+                      </p:childTnLst>
+                    </p:cTn>
+                  </p:par>
+                </p:childTnLst>
+              </p:cTn>
+              <p:prevCondLst>
+                <p:cond evt="onPrev" delay="0">
+                  <p:tgtEl>
+                    <p:sldTgt/>
+                  </p:tgtEl>
+                </p:cond>
+              </p:prevCondLst>
+              <p:nextCondLst>
+                <p:cond evt="onNext" delay="0">
+                  <p:tgtEl>
+                    <p:sldTgt/>
+                  </p:tgtEl>
+                </p:cond>
+              </p:nextCondLst>
+            </p:seq>
+          </p:childTnLst>
+        </p:cTn>
+      </p:par>
+    </p:tnLst>
+  </p:timing>
+</p:sld>
+</file>
+
+<file path=ppt/slides/slide27.xml><?xml version="1.0" encoding="utf-8"?>
+<p:sld xmlns:a="http://schemas.openxmlformats.org/drawingml/2006/main" xmlns:r="http://schemas.openxmlformats.org/officeDocument/2006/relationships" xmlns:p="http://schemas.openxmlformats.org/presentationml/2006/main">
+  <p:cSld>
+    <p:spTree>
+      <p:nvGrpSpPr>
+        <p:cNvPr id="1" name=""/>
+        <p:cNvGrpSpPr/>
+        <p:nvPr/>
+      </p:nvGrpSpPr>
+      <p:grpSpPr>
+        <a:xfrm>
+          <a:off x="0" y="0"/>
+          <a:ext cx="0" cy="0"/>
+          <a:chOff x="0" y="0"/>
+          <a:chExt cx="0" cy="0"/>
+        </a:xfrm>
+      </p:grpSpPr>
+      <p:sp>
+        <p:nvSpPr>
+          <p:cNvPr id="2" name="Title 1"/>
+          <p:cNvSpPr>
+            <a:spLocks noGrp="1"/>
+          </p:cNvSpPr>
+          <p:nvPr>
+            <p:ph type="title"/>
+          </p:nvPr>
+        </p:nvSpPr>
+        <p:spPr/>
+        <p:txBody>
+          <a:bodyPr/>
+          <a:lstStyle/>
+          <a:p>
+            <a:r>
+              <a:rPr lang="en-US" dirty="0" smtClean="0">
+                <a:latin typeface="Comic Sans MS" panose="030F0702030302020204" pitchFamily="66" charset="0"/>
+              </a:rPr>
+              <a:t>Case Studies</a:t>
+            </a:r>
+            <a:endParaRPr lang="fa-IR" dirty="0">
+              <a:latin typeface="Comic Sans MS" panose="030F0702030302020204" pitchFamily="66" charset="0"/>
+            </a:endParaRPr>
+          </a:p>
+        </p:txBody>
+      </p:sp>
+      <p:sp>
+        <p:nvSpPr>
+          <p:cNvPr id="3" name="Content Placeholder 2"/>
+          <p:cNvSpPr>
+            <a:spLocks noGrp="1"/>
+          </p:cNvSpPr>
+          <p:nvPr>
+            <p:ph idx="1"/>
+          </p:nvPr>
+        </p:nvSpPr>
+        <p:spPr/>
+        <p:txBody>
+          <a:bodyPr/>
+          <a:lstStyle/>
+          <a:p>
+            <a:r>
+              <a:rPr lang="fa-IR" dirty="0"/>
+              <a:t>بازی </a:t>
+            </a:r>
+            <a:r>
+              <a:rPr lang="fa-IR" dirty="0" smtClean="0"/>
+              <a:t>کامپیوتری</a:t>
+            </a:r>
+            <a:r>
+              <a:rPr lang="en-US" dirty="0" smtClean="0">
+                <a:latin typeface="Comic Sans MS" panose="030F0702030302020204" pitchFamily="66" charset="0"/>
+              </a:rPr>
+              <a:t>Postal </a:t>
+            </a:r>
+            <a:r>
+              <a:rPr lang="fa-IR" dirty="0" smtClean="0">
+                <a:latin typeface="Comic Sans MS" panose="030F0702030302020204" pitchFamily="66" charset="0"/>
+              </a:rPr>
+              <a:t> </a:t>
+            </a:r>
+          </a:p>
+          <a:p>
+            <a:endParaRPr lang="fa-IR" dirty="0">
+              <a:latin typeface="Comic Sans MS" panose="030F0702030302020204" pitchFamily="66" charset="0"/>
+            </a:endParaRPr>
+          </a:p>
+          <a:p>
+            <a:endParaRPr lang="fa-IR" dirty="0">
+              <a:latin typeface="Comic Sans MS" panose="030F0702030302020204" pitchFamily="66" charset="0"/>
+            </a:endParaRPr>
+          </a:p>
+        </p:txBody>
+      </p:sp>
+      <p:sp>
+        <p:nvSpPr>
+          <p:cNvPr id="4" name="Footer Placeholder 3"/>
+          <p:cNvSpPr>
+            <a:spLocks noGrp="1"/>
+          </p:cNvSpPr>
+          <p:nvPr>
+            <p:ph type="ftr" sz="quarter" idx="11"/>
+          </p:nvPr>
+        </p:nvSpPr>
+        <p:spPr/>
+        <p:txBody>
+          <a:bodyPr/>
+          <a:lstStyle/>
+          <a:p>
+            <a:pPr>
+              <a:defRPr/>
+            </a:pPr>
+            <a:r>
+              <a:rPr lang="fa-IR" altLang="fa-IR" smtClean="0"/>
+              <a:t>دانشگاه صنعتی اصفهان – دانشکده کامپیوتر</a:t>
+            </a:r>
+            <a:endParaRPr lang="es-ES" altLang="fa-IR" dirty="0"/>
+          </a:p>
+        </p:txBody>
+      </p:sp>
+      <p:sp>
+        <p:nvSpPr>
+          <p:cNvPr id="5" name="Slide Number Placeholder 4"/>
+          <p:cNvSpPr>
+            <a:spLocks noGrp="1"/>
+          </p:cNvSpPr>
+          <p:nvPr>
+            <p:ph type="sldNum" sz="quarter" idx="12"/>
+          </p:nvPr>
+        </p:nvSpPr>
+        <p:spPr/>
+        <p:txBody>
+          <a:bodyPr/>
+          <a:lstStyle/>
+          <a:p>
+            <a:pPr>
+              <a:defRPr/>
+            </a:pPr>
+            <a:fld id="{C5303A1E-C0C3-4A75-A42D-959ACBF920C8}" type="slidenum">
+              <a:rPr lang="es-ES" altLang="fa-IR" smtClean="0"/>
+              <a:pPr>
+                <a:defRPr/>
+              </a:pPr>
+              <a:t>27</a:t>
+            </a:fld>
+            <a:endParaRPr lang="es-ES" altLang="fa-IR" dirty="0"/>
+          </a:p>
+        </p:txBody>
+      </p:sp>
+    </p:spTree>
+    <p:extLst>
+      <p:ext uri="{BB962C8B-B14F-4D97-AF65-F5344CB8AC3E}">
+        <p14:creationId xmlns:p14="http://schemas.microsoft.com/office/powerpoint/2010/main" val="914991530"/>
+      </p:ext>
+    </p:extLst>
+  </p:cSld>
+  <p:clrMapOvr>
+    <a:masterClrMapping/>
+  </p:clrMapOvr>
+  <mc:AlternateContent xmlns:mc="http://schemas.openxmlformats.org/markup-compatibility/2006" xmlns:p14="http://schemas.microsoft.com/office/powerpoint/2010/main">
+    <mc:Choice Requires="p14">
+      <p:transition spd="slow" p14:dur="800">
+        <p:diamond/>
+      </p:transition>
+    </mc:Choice>
+    <mc:Fallback xmlns="">
+      <p:transition spd="slow">
+        <p:diamond/>
+      </p:transition>
+    </mc:Fallback>
+  </mc:AlternateContent>
+  <p:timing>
+    <p:tnLst>
+      <p:par>
+        <p:cTn id="1" dur="indefinite" restart="never" nodeType="tmRoot"/>
+      </p:par>
+    </p:tnLst>
+  </p:timing>
+</p:sld>
+</file>
+
+<file path=ppt/slides/slide28.xml><?xml version="1.0" encoding="utf-8"?>
+<p:sld xmlns:a="http://schemas.openxmlformats.org/drawingml/2006/main" xmlns:r="http://schemas.openxmlformats.org/officeDocument/2006/relationships" xmlns:p="http://schemas.openxmlformats.org/presentationml/2006/main">
+  <p:cSld>
+    <p:spTree>
+      <p:nvGrpSpPr>
+        <p:cNvPr id="1" name=""/>
+        <p:cNvGrpSpPr/>
+        <p:nvPr/>
+      </p:nvGrpSpPr>
+      <p:grpSpPr>
+        <a:xfrm>
+          <a:off x="0" y="0"/>
+          <a:ext cx="0" cy="0"/>
+          <a:chOff x="0" y="0"/>
+          <a:chExt cx="0" cy="0"/>
+        </a:xfrm>
+      </p:grpSpPr>
+      <p:sp>
+        <p:nvSpPr>
+          <p:cNvPr id="2" name="Title 1"/>
+          <p:cNvSpPr>
+            <a:spLocks noGrp="1"/>
+          </p:cNvSpPr>
+          <p:nvPr>
+            <p:ph type="title"/>
+          </p:nvPr>
+        </p:nvSpPr>
+        <p:spPr/>
+        <p:txBody>
+          <a:bodyPr/>
+          <a:lstStyle/>
+          <a:p>
+            <a:r>
+              <a:rPr lang="fa-IR" dirty="0" smtClean="0"/>
+              <a:t>اخلاقی</a:t>
+            </a:r>
+            <a:endParaRPr lang="fa-IR" dirty="0"/>
+          </a:p>
+        </p:txBody>
+      </p:sp>
+      <p:sp>
+        <p:nvSpPr>
+          <p:cNvPr id="3" name="Content Placeholder 2"/>
+          <p:cNvSpPr>
+            <a:spLocks noGrp="1"/>
+          </p:cNvSpPr>
+          <p:nvPr>
+            <p:ph idx="1"/>
+          </p:nvPr>
+        </p:nvSpPr>
+        <p:spPr/>
+        <p:txBody>
+          <a:bodyPr/>
+          <a:lstStyle/>
+          <a:p>
+            <a:r>
+              <a:rPr lang="fa-IR" dirty="0"/>
+              <a:t>در حال حاضر هیچ اپلیکیشنی اجازه انجام کار های خطرناک و فاسد را به کاربرانش </a:t>
+            </a:r>
+            <a:r>
+              <a:rPr lang="fa-IR" dirty="0" smtClean="0"/>
+              <a:t>نمی دهد . </a:t>
+            </a:r>
+            <a:r>
+              <a:rPr lang="fa-IR" dirty="0"/>
+              <a:t>بجز برخی اپ های ارتشی و برخی اپ </a:t>
+            </a:r>
+            <a:r>
+              <a:rPr lang="fa-IR" dirty="0" smtClean="0"/>
+              <a:t>ها </a:t>
+            </a:r>
+            <a:r>
+              <a:rPr lang="fa-IR" dirty="0"/>
+              <a:t>در دامنه ی </a:t>
+            </a:r>
+            <a:r>
+              <a:rPr lang="fa-IR" dirty="0" smtClean="0"/>
+              <a:t>پزشکی – درمانی . </a:t>
+            </a:r>
+            <a:endParaRPr lang="en-US" dirty="0"/>
+          </a:p>
+          <a:p>
+            <a:endParaRPr lang="fa-IR" dirty="0" smtClean="0"/>
+          </a:p>
+          <a:p>
+            <a:r>
+              <a:rPr lang="fa-IR" dirty="0">
+                <a:solidFill>
+                  <a:srgbClr val="FF0000"/>
+                </a:solidFill>
+              </a:rPr>
+              <a:t>اما چه کسی </a:t>
+            </a:r>
+            <a:r>
+              <a:rPr lang="fa-IR" dirty="0" smtClean="0">
+                <a:solidFill>
+                  <a:srgbClr val="FF0000"/>
+                </a:solidFill>
+              </a:rPr>
+              <a:t>می داند ؟ </a:t>
+            </a:r>
+            <a:r>
+              <a:rPr lang="fa-IR" dirty="0">
+                <a:solidFill>
+                  <a:srgbClr val="FF0000"/>
+                </a:solidFill>
+              </a:rPr>
+              <a:t>ممکن است در </a:t>
+            </a:r>
+            <a:r>
+              <a:rPr lang="fa-IR" dirty="0" smtClean="0">
+                <a:solidFill>
+                  <a:srgbClr val="FF0000"/>
+                </a:solidFill>
+              </a:rPr>
+              <a:t>آینده </a:t>
+            </a:r>
+            <a:r>
+              <a:rPr lang="fa-IR" dirty="0">
+                <a:solidFill>
+                  <a:srgbClr val="FF0000"/>
+                </a:solidFill>
+              </a:rPr>
+              <a:t>این اتفاق ناگوار </a:t>
+            </a:r>
+            <a:r>
+              <a:rPr lang="fa-IR" dirty="0" smtClean="0">
+                <a:solidFill>
+                  <a:srgbClr val="FF0000"/>
+                </a:solidFill>
+              </a:rPr>
+              <a:t>بیفتد. </a:t>
+            </a:r>
+            <a:r>
+              <a:rPr lang="fa-IR" dirty="0" smtClean="0"/>
+              <a:t>پس </a:t>
+            </a:r>
+            <a:r>
+              <a:rPr lang="fa-IR" dirty="0"/>
+              <a:t>مشکل اخلاقی آن بروز پیدا </a:t>
+            </a:r>
+            <a:r>
+              <a:rPr lang="fa-IR" dirty="0" smtClean="0"/>
+              <a:t>می کند . در </a:t>
+            </a:r>
+            <a:r>
+              <a:rPr lang="fa-IR" dirty="0"/>
+              <a:t>زمینه </a:t>
+            </a:r>
+            <a:r>
+              <a:rPr lang="fa-IR" dirty="0" smtClean="0"/>
+              <a:t>ی</a:t>
+            </a:r>
+            <a:r>
+              <a:rPr lang="en-US" dirty="0" smtClean="0">
+                <a:latin typeface="Comic Sans MS" panose="030F0702030302020204" pitchFamily="66" charset="0"/>
+              </a:rPr>
+              <a:t>gaming</a:t>
+            </a:r>
+            <a:r>
+              <a:rPr lang="en-US" dirty="0" smtClean="0"/>
+              <a:t> </a:t>
+            </a:r>
+            <a:r>
+              <a:rPr lang="fa-IR" dirty="0" smtClean="0"/>
+              <a:t> این </a:t>
+            </a:r>
+            <a:r>
+              <a:rPr lang="fa-IR" dirty="0"/>
+              <a:t>احتمال بیشتر </a:t>
+            </a:r>
+            <a:r>
+              <a:rPr lang="fa-IR" dirty="0" smtClean="0"/>
+              <a:t>است ! </a:t>
+            </a:r>
+            <a:endParaRPr lang="en-US" dirty="0"/>
+          </a:p>
+          <a:p>
+            <a:endParaRPr lang="fa-IR" dirty="0" smtClean="0"/>
+          </a:p>
+          <a:p>
+            <a:r>
+              <a:rPr lang="fa-IR" dirty="0" smtClean="0"/>
+              <a:t>تبدیل بازی های سه بعدی به بازی هایی در محیط واقعیت مجازی !!</a:t>
+            </a:r>
+            <a:endParaRPr lang="fa-IR" dirty="0"/>
+          </a:p>
+        </p:txBody>
+      </p:sp>
+      <p:sp>
+        <p:nvSpPr>
+          <p:cNvPr id="4" name="Footer Placeholder 3"/>
+          <p:cNvSpPr>
+            <a:spLocks noGrp="1"/>
+          </p:cNvSpPr>
+          <p:nvPr>
+            <p:ph type="ftr" sz="quarter" idx="11"/>
+          </p:nvPr>
+        </p:nvSpPr>
+        <p:spPr/>
+        <p:txBody>
+          <a:bodyPr/>
+          <a:lstStyle/>
+          <a:p>
+            <a:pPr>
+              <a:defRPr/>
+            </a:pPr>
+            <a:r>
+              <a:rPr lang="fa-IR" altLang="fa-IR" smtClean="0"/>
+              <a:t>دانشگاه صنعتی اصفهان – دانشکده کامپیوتر</a:t>
+            </a:r>
+            <a:endParaRPr lang="es-ES" altLang="fa-IR" dirty="0"/>
+          </a:p>
+        </p:txBody>
+      </p:sp>
+      <p:sp>
+        <p:nvSpPr>
+          <p:cNvPr id="5" name="Slide Number Placeholder 4"/>
+          <p:cNvSpPr>
+            <a:spLocks noGrp="1"/>
+          </p:cNvSpPr>
+          <p:nvPr>
+            <p:ph type="sldNum" sz="quarter" idx="12"/>
+          </p:nvPr>
+        </p:nvSpPr>
+        <p:spPr/>
+        <p:txBody>
+          <a:bodyPr/>
+          <a:lstStyle/>
+          <a:p>
+            <a:pPr>
+              <a:defRPr/>
+            </a:pPr>
+            <a:fld id="{C5303A1E-C0C3-4A75-A42D-959ACBF920C8}" type="slidenum">
+              <a:rPr lang="es-ES" altLang="fa-IR" smtClean="0"/>
+              <a:pPr>
+                <a:defRPr/>
+              </a:pPr>
+              <a:t>28</a:t>
+            </a:fld>
+            <a:endParaRPr lang="es-ES" altLang="fa-IR" dirty="0"/>
+          </a:p>
+        </p:txBody>
+      </p:sp>
+    </p:spTree>
+    <p:extLst>
+      <p:ext uri="{BB962C8B-B14F-4D97-AF65-F5344CB8AC3E}">
+        <p14:creationId xmlns:p14="http://schemas.microsoft.com/office/powerpoint/2010/main" val="1459189353"/>
+      </p:ext>
+    </p:extLst>
+  </p:cSld>
+  <p:clrMapOvr>
+    <a:masterClrMapping/>
+  </p:clrMapOvr>
+  <mc:AlternateContent xmlns:mc="http://schemas.openxmlformats.org/markup-compatibility/2006" xmlns:p14="http://schemas.microsoft.com/office/powerpoint/2010/main">
+    <mc:Choice Requires="p14">
+      <p:transition spd="slow" p14:dur="800">
+        <p:diamond/>
+      </p:transition>
+    </mc:Choice>
+    <mc:Fallback xmlns="">
+      <p:transition spd="slow">
+        <p:diamond/>
+      </p:transition>
+    </mc:Fallback>
+  </mc:AlternateContent>
+  <p:timing>
+    <p:tnLst>
+      <p:par>
+        <p:cTn id="1" dur="indefinite" restart="never" nodeType="tmRoot"/>
+      </p:par>
+    </p:tnLst>
+  </p:timing>
+</p:sld>
+</file>
+
+<file path=ppt/slides/slide29.xml><?xml version="1.0" encoding="utf-8"?>
+<p:sld xmlns:a="http://schemas.openxmlformats.org/drawingml/2006/main" xmlns:r="http://schemas.openxmlformats.org/officeDocument/2006/relationships" xmlns:p="http://schemas.openxmlformats.org/presentationml/2006/main">
+  <p:cSld>
+    <p:spTree>
+      <p:nvGrpSpPr>
+        <p:cNvPr id="1" name=""/>
+        <p:cNvGrpSpPr/>
+        <p:nvPr/>
+      </p:nvGrpSpPr>
+      <p:grpSpPr>
+        <a:xfrm>
+          <a:off x="0" y="0"/>
+          <a:ext cx="0" cy="0"/>
+          <a:chOff x="0" y="0"/>
+          <a:chExt cx="0" cy="0"/>
+        </a:xfrm>
+      </p:grpSpPr>
+      <p:sp>
+        <p:nvSpPr>
+          <p:cNvPr id="2" name="Title 1"/>
+          <p:cNvSpPr>
+            <a:spLocks noGrp="1"/>
+          </p:cNvSpPr>
+          <p:nvPr>
+            <p:ph type="title"/>
+          </p:nvPr>
+        </p:nvSpPr>
+        <p:spPr/>
+        <p:txBody>
+          <a:bodyPr/>
+          <a:lstStyle/>
+          <a:p>
+            <a:r>
+              <a:rPr lang="fa-IR" dirty="0" smtClean="0"/>
+              <a:t>نتیجه اخلاقی</a:t>
+            </a:r>
+            <a:endParaRPr lang="fa-IR" dirty="0"/>
+          </a:p>
+        </p:txBody>
+      </p:sp>
+      <p:sp>
+        <p:nvSpPr>
+          <p:cNvPr id="3" name="Content Placeholder 2"/>
+          <p:cNvSpPr>
+            <a:spLocks noGrp="1"/>
+          </p:cNvSpPr>
+          <p:nvPr>
+            <p:ph idx="1"/>
+          </p:nvPr>
+        </p:nvSpPr>
+        <p:spPr/>
+        <p:txBody>
+          <a:bodyPr/>
+          <a:lstStyle/>
+          <a:p>
+            <a:r>
+              <a:rPr lang="fa-IR" dirty="0"/>
+              <a:t>امکانات تعاملی بسیاری که در برنامه های واقعیت مجازی وجود </a:t>
+            </a:r>
+            <a:r>
+              <a:rPr lang="fa-IR" dirty="0" smtClean="0"/>
+              <a:t>دارند ، </a:t>
+            </a:r>
+            <a:r>
+              <a:rPr lang="fa-IR" dirty="0"/>
+              <a:t>استدلال شده اند که باعث بروز </a:t>
+            </a:r>
+            <a:r>
+              <a:rPr lang="fa-IR" dirty="0" smtClean="0"/>
+              <a:t>یک سری </a:t>
+            </a:r>
+            <a:r>
+              <a:rPr lang="fa-IR" dirty="0"/>
+              <a:t>ابهامات اخلاقی می </a:t>
+            </a:r>
+            <a:r>
+              <a:rPr lang="fa-IR" dirty="0" smtClean="0"/>
+              <a:t>شوند .   ( برنامه </a:t>
+            </a:r>
+            <a:r>
+              <a:rPr lang="fa-IR" dirty="0"/>
+              <a:t>ی های واقعیت مجازی مخصوصا آن هایی که هدفشان شبیه سازی واقعیعت است</a:t>
+            </a:r>
+            <a:r>
+              <a:rPr lang="fa-IR" dirty="0" smtClean="0"/>
+              <a:t> )</a:t>
+            </a:r>
+          </a:p>
+          <a:p>
+            <a:endParaRPr lang="fa-IR" dirty="0"/>
+          </a:p>
+          <a:p>
+            <a:r>
+              <a:rPr lang="fa-IR" dirty="0"/>
+              <a:t>رفتار در واقعیت مجازی هم به عنوان یکی از عوامل ایجاد مشکلات اخلاقی در این رشته مورد بحث </a:t>
+            </a:r>
+            <a:r>
+              <a:rPr lang="fa-IR" dirty="0" smtClean="0"/>
+              <a:t>است .</a:t>
+            </a:r>
+          </a:p>
+          <a:p>
+            <a:endParaRPr lang="fa-IR" dirty="0"/>
+          </a:p>
+          <a:p>
+            <a:r>
+              <a:rPr lang="fa-IR" dirty="0" smtClean="0"/>
+              <a:t>اخلاق در واقعیت مجازی به دلیل اینکه قشر عظیمی </a:t>
+            </a:r>
+            <a:r>
+              <a:rPr lang="fa-IR" dirty="0"/>
+              <a:t>از کودکان و بزرگسالان </a:t>
+            </a:r>
+            <a:r>
+              <a:rPr lang="fa-IR" dirty="0" smtClean="0"/>
+              <a:t>مخاطب آن هستند بسیار موضوع مهمی است . </a:t>
+            </a:r>
+            <a:endParaRPr lang="fa-IR" dirty="0"/>
+          </a:p>
+        </p:txBody>
+      </p:sp>
+      <p:sp>
+        <p:nvSpPr>
+          <p:cNvPr id="4" name="Footer Placeholder 3"/>
+          <p:cNvSpPr>
+            <a:spLocks noGrp="1"/>
+          </p:cNvSpPr>
+          <p:nvPr>
+            <p:ph type="ftr" sz="quarter" idx="11"/>
+          </p:nvPr>
+        </p:nvSpPr>
+        <p:spPr/>
+        <p:txBody>
+          <a:bodyPr/>
+          <a:lstStyle/>
+          <a:p>
+            <a:pPr>
+              <a:defRPr/>
+            </a:pPr>
+            <a:r>
+              <a:rPr lang="fa-IR" altLang="fa-IR" smtClean="0"/>
+              <a:t>دانشگاه صنعتی اصفهان – دانشکده کامپیوتر</a:t>
+            </a:r>
+            <a:endParaRPr lang="es-ES" altLang="fa-IR" dirty="0"/>
+          </a:p>
+        </p:txBody>
+      </p:sp>
+      <p:sp>
+        <p:nvSpPr>
+          <p:cNvPr id="5" name="Slide Number Placeholder 4"/>
+          <p:cNvSpPr>
+            <a:spLocks noGrp="1"/>
+          </p:cNvSpPr>
+          <p:nvPr>
+            <p:ph type="sldNum" sz="quarter" idx="12"/>
+          </p:nvPr>
+        </p:nvSpPr>
+        <p:spPr/>
+        <p:txBody>
+          <a:bodyPr/>
+          <a:lstStyle/>
+          <a:p>
+            <a:pPr>
+              <a:defRPr/>
+            </a:pPr>
+            <a:fld id="{C5303A1E-C0C3-4A75-A42D-959ACBF920C8}" type="slidenum">
+              <a:rPr lang="es-ES" altLang="fa-IR" smtClean="0"/>
+              <a:pPr>
+                <a:defRPr/>
+              </a:pPr>
+              <a:t>29</a:t>
+            </a:fld>
+            <a:endParaRPr lang="es-ES" altLang="fa-IR" dirty="0"/>
+          </a:p>
+        </p:txBody>
+      </p:sp>
+    </p:spTree>
+    <p:extLst>
+      <p:ext uri="{BB962C8B-B14F-4D97-AF65-F5344CB8AC3E}">
+        <p14:creationId xmlns:p14="http://schemas.microsoft.com/office/powerpoint/2010/main" val="543918719"/>
+      </p:ext>
+    </p:extLst>
+  </p:cSld>
+  <p:clrMapOvr>
+    <a:masterClrMapping/>
+  </p:clrMapOvr>
+  <mc:AlternateContent xmlns:mc="http://schemas.openxmlformats.org/markup-compatibility/2006" xmlns:p14="http://schemas.microsoft.com/office/powerpoint/2010/main">
+    <mc:Choice Requires="p14">
+      <p:transition spd="slow" p14:dur="800">
+        <p:diamond/>
+      </p:transition>
+    </mc:Choice>
+    <mc:Fallback xmlns="">
+      <p:transition spd="slow">
+        <p:diamond/>
+      </p:transition>
+    </mc:Fallback>
+  </mc:AlternateContent>
+  <p:timing>
+    <p:tnLst>
+      <p:par>
+        <p:cTn id="1" dur="indefinite" restart="never" nodeType="tmRoot"/>
+      </p:par>
+    </p:tnLst>
+  </p:timing>
+</p:sld>
+</file>
+
+<file path=ppt/slides/slide3.xml><?xml version="1.0" encoding="utf-8"?>
+<p:sld xmlns:a="http://schemas.openxmlformats.org/drawingml/2006/main" xmlns:r="http://schemas.openxmlformats.org/officeDocument/2006/relationships" xmlns:p="http://schemas.openxmlformats.org/presentationml/2006/main">
+  <p:cSld>
+    <p:spTree>
+      <p:nvGrpSpPr>
+        <p:cNvPr id="1" name=""/>
+        <p:cNvGrpSpPr/>
+        <p:nvPr/>
+      </p:nvGrpSpPr>
+      <p:grpSpPr>
+        <a:xfrm>
+          <a:off x="0" y="0"/>
+          <a:ext cx="0" cy="0"/>
+          <a:chOff x="0" y="0"/>
+          <a:chExt cx="0" cy="0"/>
+        </a:xfrm>
+      </p:grpSpPr>
+      <p:sp>
+        <p:nvSpPr>
+          <p:cNvPr id="4098" name="Rectangle 2"/>
+          <p:cNvSpPr>
+            <a:spLocks noGrp="1" noChangeArrowheads="1"/>
+          </p:cNvSpPr>
+          <p:nvPr>
+            <p:ph type="title"/>
+          </p:nvPr>
+        </p:nvSpPr>
+        <p:spPr>
+          <a:xfrm>
+            <a:off x="395288" y="188913"/>
+            <a:ext cx="8229600" cy="981075"/>
+          </a:xfrm>
+        </p:spPr>
+        <p:txBody>
+          <a:bodyPr/>
+          <a:lstStyle/>
+          <a:p>
+            <a:pPr eaLnBrk="1" hangingPunct="1"/>
+            <a:r>
+              <a:rPr lang="fa-IR" dirty="0" smtClean="0"/>
+              <a:t>مقدمه</a:t>
+            </a:r>
+            <a:endParaRPr lang="fa-IR" altLang="fa-IR" dirty="0" smtClean="0"/>
+          </a:p>
+        </p:txBody>
+      </p:sp>
+      <p:sp>
+        <p:nvSpPr>
+          <p:cNvPr id="4099" name="Rectangle 3"/>
+          <p:cNvSpPr>
+            <a:spLocks noGrp="1" noChangeArrowheads="1"/>
+          </p:cNvSpPr>
+          <p:nvPr>
+            <p:ph type="body" idx="1"/>
+          </p:nvPr>
+        </p:nvSpPr>
+        <p:spPr/>
+        <p:txBody>
+          <a:bodyPr/>
+          <a:lstStyle/>
+          <a:p>
+            <a:pPr eaLnBrk="1" hangingPunct="1"/>
+            <a:r>
+              <a:rPr lang="fa-IR" dirty="0" smtClean="0"/>
+              <a:t>واقعیت مجازی یا واقعیت شبیه سازی شده به وسیله کامپیوتر یا به انگلیسی</a:t>
+            </a:r>
+            <a:r>
+              <a:rPr lang="en-US" dirty="0" smtClean="0"/>
+              <a:t> </a:t>
+            </a:r>
+            <a:r>
+              <a:rPr lang="en-US" dirty="0" smtClean="0">
+                <a:latin typeface="Comic Sans MS" panose="030F0702030302020204" pitchFamily="66" charset="0"/>
+              </a:rPr>
+              <a:t>Virtual Reality </a:t>
+            </a:r>
+            <a:r>
+              <a:rPr lang="fa-IR" dirty="0" smtClean="0"/>
+              <a:t>که به اختصار با حروف</a:t>
+            </a:r>
+            <a:r>
+              <a:rPr lang="en-US" dirty="0" smtClean="0">
+                <a:latin typeface="Comic Sans MS" panose="030F0702030302020204" pitchFamily="66" charset="0"/>
+              </a:rPr>
+              <a:t>VR</a:t>
+            </a:r>
+            <a:r>
+              <a:rPr lang="en-US" dirty="0" smtClean="0"/>
+              <a:t> </a:t>
+            </a:r>
+            <a:r>
+              <a:rPr lang="fa-IR" dirty="0" smtClean="0"/>
+              <a:t> نمایش داده می‌شوند عبارتند از </a:t>
+            </a:r>
+            <a:r>
+              <a:rPr lang="fa-IR" dirty="0"/>
+              <a:t>محیط چند رسانه‌ای همه‌جانبه که یک محیط شبیه‌سازی کامپیوتری می‌باشد که می‌تواند حضور فیزیکی را در یک محل و در یک دنیای واقعی </a:t>
+            </a:r>
+            <a:r>
+              <a:rPr lang="fa-IR" dirty="0" smtClean="0"/>
+              <a:t>و </a:t>
+            </a:r>
+            <a:r>
+              <a:rPr lang="fa-IR" dirty="0"/>
+              <a:t>یا یک دنیای مجازی شبیه‌سازی کند که به کاربر اجازه ی تعامل در آن فضا </a:t>
+            </a:r>
+            <a:r>
+              <a:rPr lang="fa-IR" dirty="0" smtClean="0"/>
+              <a:t>را </a:t>
+            </a:r>
+            <a:r>
+              <a:rPr lang="fa-IR" dirty="0"/>
+              <a:t>می دهد .</a:t>
+            </a:r>
+            <a:endParaRPr lang="en-US" dirty="0"/>
+          </a:p>
+          <a:p>
+            <a:pPr eaLnBrk="1" hangingPunct="1"/>
+            <a:endParaRPr lang="fa-IR" dirty="0" smtClean="0"/>
+          </a:p>
+          <a:p>
+            <a:pPr eaLnBrk="1" hangingPunct="1"/>
+            <a:endParaRPr lang="fa-IR" altLang="fa-IR" dirty="0" smtClean="0"/>
+          </a:p>
+        </p:txBody>
+      </p:sp>
+      <p:pic>
+        <p:nvPicPr>
+          <p:cNvPr id="5" name="Picture 2" descr="C:\Users\asus\Desktop\450px-VR-Helm.jpg"/>
+          <p:cNvPicPr>
+            <a:picLocks noChangeAspect="1" noChangeArrowheads="1"/>
+          </p:cNvPicPr>
+          <p:nvPr/>
+        </p:nvPicPr>
+        <p:blipFill>
+          <a:blip r:embed="rId2">
+            <a:extLst>
+              <a:ext uri="{28A0092B-C50C-407E-A947-70E740481C1C}">
+                <a14:useLocalDpi xmlns:a14="http://schemas.microsoft.com/office/drawing/2010/main" val="0"/>
+              </a:ext>
+            </a:extLst>
+          </a:blip>
+          <a:srcRect/>
+          <a:stretch>
+            <a:fillRect/>
+          </a:stretch>
+        </p:blipFill>
+        <p:spPr bwMode="auto">
+          <a:xfrm>
+            <a:off x="3143153" y="4077072"/>
+            <a:ext cx="2857699" cy="1862138"/>
+          </a:xfrm>
+          <a:prstGeom prst="ellipse">
+            <a:avLst/>
+          </a:prstGeom>
+          <a:ln>
+            <a:noFill/>
+          </a:ln>
+          <a:effectLst>
+            <a:softEdge rad="112500"/>
+          </a:effectLst>
+          <a:extLst>
+            <a:ext uri="{909E8E84-426E-40DD-AFC4-6F175D3DCCD1}">
+              <a14:hiddenFill xmlns:a14="http://schemas.microsoft.com/office/drawing/2010/main">
+                <a:solidFill>
+                  <a:srgbClr val="FFFFFF"/>
+                </a:solidFill>
+              </a14:hiddenFill>
+            </a:ext>
+          </a:extLst>
+        </p:spPr>
+      </p:pic>
+      <p:sp>
+        <p:nvSpPr>
+          <p:cNvPr id="2" name="Footer Placeholder 1"/>
+          <p:cNvSpPr>
+            <a:spLocks noGrp="1"/>
+          </p:cNvSpPr>
+          <p:nvPr>
+            <p:ph type="ftr" sz="quarter" idx="11"/>
+          </p:nvPr>
+        </p:nvSpPr>
+        <p:spPr/>
+        <p:txBody>
+          <a:bodyPr/>
+          <a:lstStyle/>
+          <a:p>
+            <a:pPr>
+              <a:defRPr/>
+            </a:pPr>
+            <a:r>
+              <a:rPr lang="fa-IR" altLang="fa-IR" smtClean="0"/>
+              <a:t>دانشگاه صنعتی اصفهان – دانشکده کامپیوتر</a:t>
+            </a:r>
+            <a:endParaRPr lang="es-ES" altLang="fa-IR" dirty="0"/>
+          </a:p>
+        </p:txBody>
+      </p:sp>
+      <p:sp>
+        <p:nvSpPr>
+          <p:cNvPr id="3" name="Slide Number Placeholder 2"/>
+          <p:cNvSpPr>
+            <a:spLocks noGrp="1"/>
+          </p:cNvSpPr>
+          <p:nvPr>
+            <p:ph type="sldNum" sz="quarter" idx="12"/>
+          </p:nvPr>
+        </p:nvSpPr>
+        <p:spPr/>
+        <p:txBody>
+          <a:bodyPr/>
+          <a:lstStyle/>
+          <a:p>
+            <a:pPr>
+              <a:defRPr/>
+            </a:pPr>
+            <a:fld id="{C5303A1E-C0C3-4A75-A42D-959ACBF920C8}" type="slidenum">
+              <a:rPr lang="es-ES" altLang="fa-IR" smtClean="0"/>
+              <a:pPr>
+                <a:defRPr/>
+              </a:pPr>
+              <a:t>3</a:t>
+            </a:fld>
+            <a:endParaRPr lang="es-ES" altLang="fa-IR" dirty="0"/>
+          </a:p>
+        </p:txBody>
+      </p:sp>
+    </p:spTree>
+  </p:cSld>
+  <p:clrMapOvr>
+    <a:masterClrMapping/>
+  </p:clrMapOvr>
+  <mc:AlternateContent xmlns:mc="http://schemas.openxmlformats.org/markup-compatibility/2006" xmlns:p14="http://schemas.microsoft.com/office/powerpoint/2010/main">
+    <mc:Choice Requires="p14">
+      <p:transition spd="slow" p14:dur="800">
+        <p:diamond/>
+      </p:transition>
+    </mc:Choice>
+    <mc:Fallback xmlns="">
+      <p:transition spd="slow">
+        <p:diamond/>
+      </p:transition>
+    </mc:Fallback>
+  </mc:AlternateContent>
+  <p:timing>
+    <p:tnLst>
+      <p:par>
+        <p:cTn id="1" dur="indefinite" restart="never" nodeType="tmRoot">
+          <p:childTnLst>
+            <p:seq concurrent="1" nextAc="seek">
+              <p:cTn id="2" dur="indefinite" nodeType="mainSeq">
+                <p:childTnLst>
+                  <p:par>
+                    <p:cTn id="3" fill="hold">
+                      <p:stCondLst>
+                        <p:cond delay="indefinite"/>
+                        <p:cond evt="onBegin" delay="0">
+                          <p:tn val="2"/>
+                        </p:cond>
+                      </p:stCondLst>
+                      <p:childTnLst>
+                        <p:par>
+                          <p:cTn id="4" fill="hold">
+                            <p:stCondLst>
+                              <p:cond delay="0"/>
+                            </p:stCondLst>
+                            <p:childTnLst>
+                              <p:par>
+                                <p:cTn id="5" presetID="31" presetClass="entr" presetSubtype="0" fill="hold" nodeType="afterEffect">
+                                  <p:stCondLst>
+                                    <p:cond delay="0"/>
+                                  </p:stCondLst>
+                                  <p:childTnLst>
+                                    <p:set>
+                                      <p:cBhvr>
+                                        <p:cTn id="6" dur="1" fill="hold">
+                                          <p:stCondLst>
+                                            <p:cond delay="0"/>
+                                          </p:stCondLst>
+                                        </p:cTn>
+                                        <p:tgtEl>
+                                          <p:spTgt spid="5"/>
+                                        </p:tgtEl>
+                                        <p:attrNameLst>
+                                          <p:attrName>style.visibility</p:attrName>
+                                        </p:attrNameLst>
+                                      </p:cBhvr>
+                                      <p:to>
+                                        <p:strVal val="visible"/>
+                                      </p:to>
+                                    </p:set>
+                                    <p:anim calcmode="lin" valueType="num">
+                                      <p:cBhvr>
+                                        <p:cTn id="7" dur="1000" fill="hold"/>
+                                        <p:tgtEl>
+                                          <p:spTgt spid="5"/>
+                                        </p:tgtEl>
+                                        <p:attrNameLst>
+                                          <p:attrName>ppt_w</p:attrName>
+                                        </p:attrNameLst>
+                                      </p:cBhvr>
+                                      <p:tavLst>
+                                        <p:tav tm="0">
+                                          <p:val>
+                                            <p:fltVal val="0"/>
+                                          </p:val>
+                                        </p:tav>
+                                        <p:tav tm="100000">
+                                          <p:val>
+                                            <p:strVal val="#ppt_w"/>
+                                          </p:val>
+                                        </p:tav>
+                                      </p:tavLst>
+                                    </p:anim>
+                                    <p:anim calcmode="lin" valueType="num">
+                                      <p:cBhvr>
+                                        <p:cTn id="8" dur="1000" fill="hold"/>
+                                        <p:tgtEl>
+                                          <p:spTgt spid="5"/>
+                                        </p:tgtEl>
+                                        <p:attrNameLst>
+                                          <p:attrName>ppt_h</p:attrName>
+                                        </p:attrNameLst>
+                                      </p:cBhvr>
+                                      <p:tavLst>
+                                        <p:tav tm="0">
+                                          <p:val>
+                                            <p:fltVal val="0"/>
+                                          </p:val>
+                                        </p:tav>
+                                        <p:tav tm="100000">
+                                          <p:val>
+                                            <p:strVal val="#ppt_h"/>
+                                          </p:val>
+                                        </p:tav>
+                                      </p:tavLst>
+                                    </p:anim>
+                                    <p:anim calcmode="lin" valueType="num">
+                                      <p:cBhvr>
+                                        <p:cTn id="9" dur="1000" fill="hold"/>
+                                        <p:tgtEl>
+                                          <p:spTgt spid="5"/>
+                                        </p:tgtEl>
+                                        <p:attrNameLst>
+                                          <p:attrName>style.rotation</p:attrName>
+                                        </p:attrNameLst>
+                                      </p:cBhvr>
+                                      <p:tavLst>
+                                        <p:tav tm="0">
+                                          <p:val>
+                                            <p:fltVal val="90"/>
+                                          </p:val>
+                                        </p:tav>
+                                        <p:tav tm="100000">
+                                          <p:val>
+                                            <p:fltVal val="0"/>
+                                          </p:val>
+                                        </p:tav>
+                                      </p:tavLst>
+                                    </p:anim>
+                                    <p:animEffect transition="in" filter="fade">
+                                      <p:cBhvr>
+                                        <p:cTn id="10" dur="1000"/>
+                                        <p:tgtEl>
+                                          <p:spTgt spid="5"/>
+                                        </p:tgtEl>
+                                      </p:cBhvr>
+                                    </p:animEffect>
+                                  </p:childTnLst>
+                                </p:cTn>
+                              </p:par>
+                            </p:childTnLst>
+                          </p:cTn>
+                        </p:par>
+                      </p:childTnLst>
+                    </p:cTn>
+                  </p:par>
+                </p:childTnLst>
+              </p:cTn>
+              <p:prevCondLst>
+                <p:cond evt="onPrev" delay="0">
+                  <p:tgtEl>
+                    <p:sldTgt/>
+                  </p:tgtEl>
+                </p:cond>
+              </p:prevCondLst>
+              <p:nextCondLst>
+                <p:cond evt="onNext" delay="0">
+                  <p:tgtEl>
+                    <p:sldTgt/>
+                  </p:tgtEl>
+                </p:cond>
+              </p:nextCondLst>
+            </p:seq>
+          </p:childTnLst>
+        </p:cTn>
+      </p:par>
+    </p:tnLst>
+  </p:timing>
+</p:sld>
+</file>
+
+<file path=ppt/slides/slide30.xml><?xml version="1.0" encoding="utf-8"?>
+<p:sld xmlns:a="http://schemas.openxmlformats.org/drawingml/2006/main" xmlns:r="http://schemas.openxmlformats.org/officeDocument/2006/relationships" xmlns:p="http://schemas.openxmlformats.org/presentationml/2006/main">
+  <p:cSld>
+    <p:spTree>
+      <p:nvGrpSpPr>
+        <p:cNvPr id="1" name=""/>
+        <p:cNvGrpSpPr/>
+        <p:nvPr/>
+      </p:nvGrpSpPr>
+      <p:grpSpPr>
+        <a:xfrm>
+          <a:off x="0" y="0"/>
+          <a:ext cx="0" cy="0"/>
+          <a:chOff x="0" y="0"/>
+          <a:chExt cx="0" cy="0"/>
+        </a:xfrm>
+      </p:grpSpPr>
+      <p:sp>
+        <p:nvSpPr>
+          <p:cNvPr id="2" name="Title 1"/>
+          <p:cNvSpPr>
+            <a:spLocks noGrp="1"/>
+          </p:cNvSpPr>
+          <p:nvPr>
+            <p:ph type="title"/>
+          </p:nvPr>
+        </p:nvSpPr>
+        <p:spPr/>
+        <p:txBody>
+          <a:bodyPr/>
+          <a:lstStyle/>
+          <a:p>
+            <a:r>
+              <a:rPr lang="fa-IR" dirty="0" smtClean="0"/>
+              <a:t>واقعیت مجازی در ایران</a:t>
+            </a:r>
+            <a:endParaRPr lang="fa-IR" dirty="0"/>
+          </a:p>
+        </p:txBody>
+      </p:sp>
+      <p:sp>
+        <p:nvSpPr>
+          <p:cNvPr id="3" name="Content Placeholder 2"/>
+          <p:cNvSpPr>
+            <a:spLocks noGrp="1"/>
+          </p:cNvSpPr>
+          <p:nvPr>
+            <p:ph idx="1"/>
+          </p:nvPr>
+        </p:nvSpPr>
+        <p:spPr>
+          <a:xfrm>
+            <a:off x="1547664" y="1412776"/>
+            <a:ext cx="7139136" cy="4713387"/>
+          </a:xfrm>
+        </p:spPr>
+        <p:txBody>
+          <a:bodyPr/>
+          <a:lstStyle/>
+          <a:p>
+            <a:r>
+              <a:rPr lang="fa-IR" dirty="0" smtClean="0">
+                <a:solidFill>
+                  <a:srgbClr val="00B0F0"/>
+                </a:solidFill>
+              </a:rPr>
+              <a:t>مؤسسه رسانه پرداز آمیتیس </a:t>
+            </a:r>
+            <a:r>
+              <a:rPr lang="fa-IR" dirty="0" smtClean="0"/>
+              <a:t>سازنده بازی رایانه‌ای « مبارزه در خلیج عدن » در تاریخ ۲۲ دی ماه سال ۱۳۹۳ برای اولین بار از دستاورد خود در حوزه واقعیت مجازی رونمایی کرد . تبدیل انواع هدست‌های نمایشگر سه بعدی ( </a:t>
+            </a:r>
+            <a:r>
+              <a:rPr lang="en-US" dirty="0" smtClean="0">
+                <a:latin typeface="Comic Sans MS" panose="030F0702030302020204" pitchFamily="66" charset="0"/>
+              </a:rPr>
+              <a:t>3D Viewer</a:t>
+            </a:r>
+            <a:r>
+              <a:rPr lang="fa-IR" dirty="0"/>
+              <a:t> ) به هدست واقعیت مجازی ، توسعه و گسترش این تکنولوژی به منظور بهره‌برداری در شهربازی‌ها و مباحث شبیه‌ساز تنها بخشی از فعالیت‌های استودیو آمیتیس در این زمینه است . لازم است ذکر شود این محصول تحت عنوان </a:t>
+            </a:r>
+            <a:r>
+              <a:rPr lang="en-US" dirty="0" err="1">
+                <a:latin typeface="Comic Sans MS" panose="030F0702030302020204" pitchFamily="66" charset="0"/>
+              </a:rPr>
+              <a:t>Amytech</a:t>
+            </a:r>
+            <a:r>
+              <a:rPr lang="en-US" dirty="0">
+                <a:latin typeface="Comic Sans MS" panose="030F0702030302020204" pitchFamily="66" charset="0"/>
+              </a:rPr>
+              <a:t> </a:t>
+            </a:r>
+            <a:r>
+              <a:rPr lang="en-US" dirty="0" smtClean="0">
+                <a:latin typeface="Comic Sans MS" panose="030F0702030302020204" pitchFamily="66" charset="0"/>
+              </a:rPr>
+              <a:t>1</a:t>
+            </a:r>
+            <a:r>
+              <a:rPr lang="fa-IR" dirty="0" smtClean="0"/>
+              <a:t> اولین </a:t>
+            </a:r>
+            <a:r>
+              <a:rPr lang="fa-IR" dirty="0"/>
+              <a:t>هدست واقعیت مجازی مبتنی بر کامپیوتر ایرانی در چهارمین دوره نمایشگاه شهر بازی و اوقات فراغت رونمایی </a:t>
+            </a:r>
+            <a:r>
+              <a:rPr lang="fa-IR" dirty="0" smtClean="0"/>
+              <a:t>گردید .</a:t>
+            </a:r>
+            <a:endParaRPr lang="fa-IR" dirty="0"/>
+          </a:p>
+        </p:txBody>
+      </p:sp>
+      <p:sp>
+        <p:nvSpPr>
+          <p:cNvPr id="4" name="Footer Placeholder 3"/>
+          <p:cNvSpPr>
+            <a:spLocks noGrp="1"/>
+          </p:cNvSpPr>
+          <p:nvPr>
+            <p:ph type="ftr" sz="quarter" idx="11"/>
+          </p:nvPr>
+        </p:nvSpPr>
+        <p:spPr/>
+        <p:txBody>
+          <a:bodyPr/>
+          <a:lstStyle/>
+          <a:p>
+            <a:pPr>
+              <a:defRPr/>
+            </a:pPr>
+            <a:r>
+              <a:rPr lang="fa-IR" altLang="fa-IR" smtClean="0"/>
+              <a:t>دانشگاه صنعتی اصفهان – دانشکده کامپیوتر</a:t>
+            </a:r>
+            <a:endParaRPr lang="es-ES" altLang="fa-IR" dirty="0"/>
+          </a:p>
+        </p:txBody>
+      </p:sp>
+      <p:sp>
+        <p:nvSpPr>
+          <p:cNvPr id="5" name="Slide Number Placeholder 4"/>
+          <p:cNvSpPr>
+            <a:spLocks noGrp="1"/>
+          </p:cNvSpPr>
+          <p:nvPr>
+            <p:ph type="sldNum" sz="quarter" idx="12"/>
+          </p:nvPr>
+        </p:nvSpPr>
+        <p:spPr/>
+        <p:txBody>
+          <a:bodyPr/>
+          <a:lstStyle/>
+          <a:p>
+            <a:pPr>
+              <a:defRPr/>
+            </a:pPr>
+            <a:fld id="{C5303A1E-C0C3-4A75-A42D-959ACBF920C8}" type="slidenum">
+              <a:rPr lang="es-ES" altLang="fa-IR" smtClean="0"/>
+              <a:pPr>
+                <a:defRPr/>
+              </a:pPr>
+              <a:t>30</a:t>
             </a:fld>
             <a:endParaRPr lang="es-ES" altLang="fa-IR" dirty="0"/>
           </a:p>
@@ -12046,7 +14361,7 @@
 </p:sld>
 </file>
 
-<file path=ppt/slides/slide25.xml><?xml version="1.0" encoding="utf-8"?>
+<file path=ppt/slides/slide31.xml><?xml version="1.0" encoding="utf-8"?>
 <p:sld xmlns:a="http://schemas.openxmlformats.org/drawingml/2006/main" xmlns:r="http://schemas.openxmlformats.org/officeDocument/2006/relationships" xmlns:p="http://schemas.openxmlformats.org/presentationml/2006/main">
   <p:cSld>
     <p:spTree>
@@ -12184,7 +14499,7 @@
               <a:pPr>
                 <a:defRPr/>
               </a:pPr>
-              <a:t>25</a:t>
+              <a:t>31</a:t>
             </a:fld>
             <a:endParaRPr lang="es-ES" altLang="fa-IR" dirty="0"/>
           </a:p>
@@ -12369,7 +14684,7 @@
 </p:sld>
 </file>
 
-<file path=ppt/slides/slide26.xml><?xml version="1.0" encoding="utf-8"?>
+<file path=ppt/slides/slide32.xml><?xml version="1.0" encoding="utf-8"?>
 <p:sld xmlns:a="http://schemas.openxmlformats.org/drawingml/2006/main" xmlns:r="http://schemas.openxmlformats.org/officeDocument/2006/relationships" xmlns:p="http://schemas.openxmlformats.org/presentationml/2006/main">
   <p:cSld>
     <p:spTree>
@@ -12499,7 +14814,7 @@
               <a:pPr>
                 <a:defRPr/>
               </a:pPr>
-              <a:t>26</a:t>
+              <a:t>32</a:t>
             </a:fld>
             <a:endParaRPr lang="es-ES" altLang="fa-IR" dirty="0"/>
           </a:p>
@@ -12537,7 +14852,7 @@
 </p:sld>
 </file>
 
-<file path=ppt/slides/slide27.xml><?xml version="1.0" encoding="utf-8"?>
+<file path=ppt/slides/slide33.xml><?xml version="1.0" encoding="utf-8"?>
 <p:sld xmlns:a="http://schemas.openxmlformats.org/drawingml/2006/main" xmlns:r="http://schemas.openxmlformats.org/officeDocument/2006/relationships" xmlns:p="http://schemas.openxmlformats.org/presentationml/2006/main">
   <p:cSld>
     <p:spTree>
@@ -12767,7 +15082,7 @@
               <a:pPr>
                 <a:defRPr/>
               </a:pPr>
-              <a:t>27</a:t>
+              <a:t>33</a:t>
             </a:fld>
             <a:endParaRPr lang="es-ES" altLang="fa-IR" dirty="0"/>
           </a:p>
@@ -12805,7 +15120,7 @@
 </p:sld>
 </file>
 
-<file path=ppt/slides/slide28.xml><?xml version="1.0" encoding="utf-8"?>
+<file path=ppt/slides/slide34.xml><?xml version="1.0" encoding="utf-8"?>
 <p:sld xmlns:a="http://schemas.openxmlformats.org/drawingml/2006/main" xmlns:r="http://schemas.openxmlformats.org/officeDocument/2006/relationships" xmlns:p="http://schemas.openxmlformats.org/presentationml/2006/main">
   <p:cSld>
     <p:spTree>
@@ -12993,7 +15308,7 @@
               <a:pPr>
                 <a:defRPr/>
               </a:pPr>
-              <a:t>28</a:t>
+              <a:t>34</a:t>
             </a:fld>
             <a:endParaRPr lang="es-ES" altLang="fa-IR" dirty="0"/>
           </a:p>
@@ -13339,408 +15654,6 @@
     <p:bldLst>
       <p:bldP spid="6" grpId="0"/>
     </p:bldLst>
-  </p:timing>
-</p:sld>
-</file>
-
-<file path=ppt/slides/slide3.xml><?xml version="1.0" encoding="utf-8"?>
-<p:sld xmlns:a="http://schemas.openxmlformats.org/drawingml/2006/main" xmlns:r="http://schemas.openxmlformats.org/officeDocument/2006/relationships" xmlns:p="http://schemas.openxmlformats.org/presentationml/2006/main">
-  <p:cSld>
-    <p:spTree>
-      <p:nvGrpSpPr>
-        <p:cNvPr id="1" name=""/>
-        <p:cNvGrpSpPr/>
-        <p:nvPr/>
-      </p:nvGrpSpPr>
-      <p:grpSpPr>
-        <a:xfrm>
-          <a:off x="0" y="0"/>
-          <a:ext cx="0" cy="0"/>
-          <a:chOff x="0" y="0"/>
-          <a:chExt cx="0" cy="0"/>
-        </a:xfrm>
-      </p:grpSpPr>
-      <p:sp>
-        <p:nvSpPr>
-          <p:cNvPr id="4098" name="Rectangle 2"/>
-          <p:cNvSpPr>
-            <a:spLocks noGrp="1" noChangeArrowheads="1"/>
-          </p:cNvSpPr>
-          <p:nvPr>
-            <p:ph type="title"/>
-          </p:nvPr>
-        </p:nvSpPr>
-        <p:spPr>
-          <a:xfrm>
-            <a:off x="395288" y="188913"/>
-            <a:ext cx="8229600" cy="981075"/>
-          </a:xfrm>
-        </p:spPr>
-        <p:txBody>
-          <a:bodyPr/>
-          <a:lstStyle/>
-          <a:p>
-            <a:pPr eaLnBrk="1" hangingPunct="1"/>
-            <a:r>
-              <a:rPr lang="fa-IR" dirty="0" smtClean="0"/>
-              <a:t>مقدمه</a:t>
-            </a:r>
-            <a:endParaRPr lang="fa-IR" altLang="fa-IR" dirty="0" smtClean="0"/>
-          </a:p>
-        </p:txBody>
-      </p:sp>
-      <p:sp>
-        <p:nvSpPr>
-          <p:cNvPr id="4099" name="Rectangle 3"/>
-          <p:cNvSpPr>
-            <a:spLocks noGrp="1" noChangeArrowheads="1"/>
-          </p:cNvSpPr>
-          <p:nvPr>
-            <p:ph type="body" idx="1"/>
-          </p:nvPr>
-        </p:nvSpPr>
-        <p:spPr/>
-        <p:txBody>
-          <a:bodyPr/>
-          <a:lstStyle/>
-          <a:p>
-            <a:pPr eaLnBrk="1" hangingPunct="1"/>
-            <a:r>
-              <a:rPr lang="fa-IR" dirty="0" smtClean="0"/>
-              <a:t>واقعیت مجازی یا واقعیت شبیه سازی شده به وسیله کامپیوتر یا به انگلیسی</a:t>
-            </a:r>
-            <a:r>
-              <a:rPr lang="en-US" dirty="0" smtClean="0"/>
-              <a:t> </a:t>
-            </a:r>
-            <a:r>
-              <a:rPr lang="en-US" dirty="0" smtClean="0">
-                <a:latin typeface="Comic Sans MS" panose="030F0702030302020204" pitchFamily="66" charset="0"/>
-              </a:rPr>
-              <a:t>Virtual Reality </a:t>
-            </a:r>
-            <a:r>
-              <a:rPr lang="fa-IR" dirty="0" smtClean="0"/>
-              <a:t>که به اختصار با حروف</a:t>
-            </a:r>
-            <a:r>
-              <a:rPr lang="en-US" dirty="0" smtClean="0">
-                <a:latin typeface="Comic Sans MS" panose="030F0702030302020204" pitchFamily="66" charset="0"/>
-              </a:rPr>
-              <a:t>VR</a:t>
-            </a:r>
-            <a:r>
-              <a:rPr lang="en-US" dirty="0" smtClean="0"/>
-              <a:t> </a:t>
-            </a:r>
-            <a:r>
-              <a:rPr lang="fa-IR" dirty="0" smtClean="0"/>
-              <a:t> نمایش داده می‌شوند عبارتند از </a:t>
-            </a:r>
-            <a:r>
-              <a:rPr lang="fa-IR" dirty="0"/>
-              <a:t>محیط چند رسانه‌ای همه‌جانبه که یک محیط شبیه‌سازی کامپیوتری می‌باشد که می‌تواند حضور فیزیکی را در یک محل و در یک دنیای واقعی </a:t>
-            </a:r>
-            <a:r>
-              <a:rPr lang="fa-IR" dirty="0" smtClean="0"/>
-              <a:t>و </a:t>
-            </a:r>
-            <a:r>
-              <a:rPr lang="fa-IR" dirty="0"/>
-              <a:t>یا یک دنیای مجازی شبیه‌سازی کند که به کاربر اجازه ی تعامل در آن فضا </a:t>
-            </a:r>
-            <a:r>
-              <a:rPr lang="fa-IR" dirty="0" smtClean="0"/>
-              <a:t>را </a:t>
-            </a:r>
-            <a:r>
-              <a:rPr lang="fa-IR" dirty="0"/>
-              <a:t>می دهد .</a:t>
-            </a:r>
-            <a:endParaRPr lang="en-US" dirty="0"/>
-          </a:p>
-          <a:p>
-            <a:pPr eaLnBrk="1" hangingPunct="1"/>
-            <a:endParaRPr lang="fa-IR" dirty="0" smtClean="0"/>
-          </a:p>
-          <a:p>
-            <a:pPr eaLnBrk="1" hangingPunct="1"/>
-            <a:endParaRPr lang="fa-IR" altLang="fa-IR" dirty="0" smtClean="0"/>
-          </a:p>
-        </p:txBody>
-      </p:sp>
-      <p:pic>
-        <p:nvPicPr>
-          <p:cNvPr id="5" name="Picture 2" descr="C:\Users\asus\Desktop\450px-VR-Helm.jpg"/>
-          <p:cNvPicPr>
-            <a:picLocks noChangeAspect="1" noChangeArrowheads="1"/>
-          </p:cNvPicPr>
-          <p:nvPr/>
-        </p:nvPicPr>
-        <p:blipFill>
-          <a:blip r:embed="rId2">
-            <a:extLst>
-              <a:ext uri="{28A0092B-C50C-407E-A947-70E740481C1C}">
-                <a14:useLocalDpi xmlns:a14="http://schemas.microsoft.com/office/drawing/2010/main" val="0"/>
-              </a:ext>
-            </a:extLst>
-          </a:blip>
-          <a:srcRect/>
-          <a:stretch>
-            <a:fillRect/>
-          </a:stretch>
-        </p:blipFill>
-        <p:spPr bwMode="auto">
-          <a:xfrm>
-            <a:off x="3143153" y="4077072"/>
-            <a:ext cx="2857699" cy="1862138"/>
-          </a:xfrm>
-          <a:prstGeom prst="ellipse">
-            <a:avLst/>
-          </a:prstGeom>
-          <a:ln>
-            <a:noFill/>
-          </a:ln>
-          <a:effectLst>
-            <a:softEdge rad="112500"/>
-          </a:effectLst>
-          <a:extLst>
-            <a:ext uri="{909E8E84-426E-40DD-AFC4-6F175D3DCCD1}">
-              <a14:hiddenFill xmlns:a14="http://schemas.microsoft.com/office/drawing/2010/main">
-                <a:solidFill>
-                  <a:srgbClr val="FFFFFF"/>
-                </a:solidFill>
-              </a14:hiddenFill>
-            </a:ext>
-          </a:extLst>
-        </p:spPr>
-      </p:pic>
-      <p:sp>
-        <p:nvSpPr>
-          <p:cNvPr id="2" name="Footer Placeholder 1"/>
-          <p:cNvSpPr>
-            <a:spLocks noGrp="1"/>
-          </p:cNvSpPr>
-          <p:nvPr>
-            <p:ph type="ftr" sz="quarter" idx="11"/>
-          </p:nvPr>
-        </p:nvSpPr>
-        <p:spPr/>
-        <p:txBody>
-          <a:bodyPr/>
-          <a:lstStyle/>
-          <a:p>
-            <a:pPr>
-              <a:defRPr/>
-            </a:pPr>
-            <a:r>
-              <a:rPr lang="fa-IR" altLang="fa-IR" smtClean="0"/>
-              <a:t>دانشگاه صنعتی اصفهان – دانشکده کامپیوتر</a:t>
-            </a:r>
-            <a:endParaRPr lang="es-ES" altLang="fa-IR" dirty="0"/>
-          </a:p>
-        </p:txBody>
-      </p:sp>
-      <p:sp>
-        <p:nvSpPr>
-          <p:cNvPr id="3" name="Slide Number Placeholder 2"/>
-          <p:cNvSpPr>
-            <a:spLocks noGrp="1"/>
-          </p:cNvSpPr>
-          <p:nvPr>
-            <p:ph type="sldNum" sz="quarter" idx="12"/>
-          </p:nvPr>
-        </p:nvSpPr>
-        <p:spPr/>
-        <p:txBody>
-          <a:bodyPr/>
-          <a:lstStyle/>
-          <a:p>
-            <a:pPr>
-              <a:defRPr/>
-            </a:pPr>
-            <a:fld id="{C5303A1E-C0C3-4A75-A42D-959ACBF920C8}" type="slidenum">
-              <a:rPr lang="es-ES" altLang="fa-IR" smtClean="0"/>
-              <a:pPr>
-                <a:defRPr/>
-              </a:pPr>
-              <a:t>3</a:t>
-            </a:fld>
-            <a:endParaRPr lang="es-ES" altLang="fa-IR" dirty="0"/>
-          </a:p>
-        </p:txBody>
-      </p:sp>
-    </p:spTree>
-  </p:cSld>
-  <p:clrMapOvr>
-    <a:masterClrMapping/>
-  </p:clrMapOvr>
-  <mc:AlternateContent xmlns:mc="http://schemas.openxmlformats.org/markup-compatibility/2006" xmlns:p14="http://schemas.microsoft.com/office/powerpoint/2010/main">
-    <mc:Choice Requires="p14">
-      <p:transition spd="slow" p14:dur="800">
-        <p:diamond/>
-      </p:transition>
-    </mc:Choice>
-    <mc:Fallback xmlns="">
-      <p:transition spd="slow">
-        <p:diamond/>
-      </p:transition>
-    </mc:Fallback>
-  </mc:AlternateContent>
-  <p:timing>
-    <p:tnLst>
-      <p:par>
-        <p:cTn id="1" dur="indefinite" restart="never" nodeType="tmRoot">
-          <p:childTnLst>
-            <p:seq concurrent="1" nextAc="seek">
-              <p:cTn id="2" dur="indefinite" nodeType="mainSeq">
-                <p:childTnLst>
-                  <p:par>
-                    <p:cTn id="3" fill="hold">
-                      <p:stCondLst>
-                        <p:cond delay="indefinite"/>
-                        <p:cond evt="onBegin" delay="0">
-                          <p:tn val="2"/>
-                        </p:cond>
-                      </p:stCondLst>
-                      <p:childTnLst>
-                        <p:par>
-                          <p:cTn id="4" fill="hold">
-                            <p:stCondLst>
-                              <p:cond delay="0"/>
-                            </p:stCondLst>
-                            <p:childTnLst>
-                              <p:par>
-                                <p:cTn id="5" presetID="31" presetClass="entr" presetSubtype="0" fill="hold" nodeType="afterEffect">
-                                  <p:stCondLst>
-                                    <p:cond delay="0"/>
-                                  </p:stCondLst>
-                                  <p:childTnLst>
-                                    <p:set>
-                                      <p:cBhvr>
-                                        <p:cTn id="6" dur="1" fill="hold">
-                                          <p:stCondLst>
-                                            <p:cond delay="0"/>
-                                          </p:stCondLst>
-                                        </p:cTn>
-                                        <p:tgtEl>
-                                          <p:spTgt spid="5"/>
-                                        </p:tgtEl>
-                                        <p:attrNameLst>
-                                          <p:attrName>style.visibility</p:attrName>
-                                        </p:attrNameLst>
-                                      </p:cBhvr>
-                                      <p:to>
-                                        <p:strVal val="visible"/>
-                                      </p:to>
-                                    </p:set>
-                                    <p:anim calcmode="lin" valueType="num">
-                                      <p:cBhvr>
-                                        <p:cTn id="7" dur="1000" fill="hold"/>
-                                        <p:tgtEl>
-                                          <p:spTgt spid="5"/>
-                                        </p:tgtEl>
-                                        <p:attrNameLst>
-                                          <p:attrName>ppt_w</p:attrName>
-                                        </p:attrNameLst>
-                                      </p:cBhvr>
-                                      <p:tavLst>
-                                        <p:tav tm="0">
-                                          <p:val>
-                                            <p:fltVal val="0"/>
-                                          </p:val>
-                                        </p:tav>
-                                        <p:tav tm="100000">
-                                          <p:val>
-                                            <p:strVal val="#ppt_w"/>
-                                          </p:val>
-                                        </p:tav>
-                                      </p:tavLst>
-                                    </p:anim>
-                                    <p:anim calcmode="lin" valueType="num">
-                                      <p:cBhvr>
-                                        <p:cTn id="8" dur="1000" fill="hold"/>
-                                        <p:tgtEl>
-                                          <p:spTgt spid="5"/>
-                                        </p:tgtEl>
-                                        <p:attrNameLst>
-                                          <p:attrName>ppt_h</p:attrName>
-                                        </p:attrNameLst>
-                                      </p:cBhvr>
-                                      <p:tavLst>
-                                        <p:tav tm="0">
-                                          <p:val>
-                                            <p:fltVal val="0"/>
-                                          </p:val>
-                                        </p:tav>
-                                        <p:tav tm="100000">
-                                          <p:val>
-                                            <p:strVal val="#ppt_h"/>
-                                          </p:val>
-                                        </p:tav>
-                                      </p:tavLst>
-                                    </p:anim>
-                                    <p:anim calcmode="lin" valueType="num">
-                                      <p:cBhvr>
-                                        <p:cTn id="9" dur="1000" fill="hold"/>
-                                        <p:tgtEl>
-                                          <p:spTgt spid="5"/>
-                                        </p:tgtEl>
-                                        <p:attrNameLst>
-                                          <p:attrName>style.rotation</p:attrName>
-                                        </p:attrNameLst>
-                                      </p:cBhvr>
-                                      <p:tavLst>
-                                        <p:tav tm="0">
-                                          <p:val>
-                                            <p:fltVal val="90"/>
-                                          </p:val>
-                                        </p:tav>
-                                        <p:tav tm="100000">
-                                          <p:val>
-                                            <p:fltVal val="0"/>
-                                          </p:val>
-                                        </p:tav>
-                                      </p:tavLst>
-                                    </p:anim>
-                                    <p:animEffect transition="in" filter="fade">
-                                      <p:cBhvr>
-                                        <p:cTn id="10" dur="1000"/>
-                                        <p:tgtEl>
-                                          <p:spTgt spid="5"/>
-                                        </p:tgtEl>
-                                      </p:cBhvr>
-                                    </p:animEffect>
-                                  </p:childTnLst>
-                                </p:cTn>
-                              </p:par>
-                            </p:childTnLst>
-                          </p:cTn>
-                        </p:par>
-                      </p:childTnLst>
-                    </p:cTn>
-                  </p:par>
-                </p:childTnLst>
-              </p:cTn>
-              <p:prevCondLst>
-                <p:cond evt="onPrev" delay="0">
-                  <p:tgtEl>
-                    <p:sldTgt/>
-                  </p:tgtEl>
-                </p:cond>
-              </p:prevCondLst>
-              <p:nextCondLst>
-                <p:cond evt="onNext" delay="0">
-                  <p:tgtEl>
-                    <p:sldTgt/>
-                  </p:tgtEl>
-                </p:cond>
-              </p:nextCondLst>
-            </p:seq>
-          </p:childTnLst>
-        </p:cTn>
-      </p:par>
-    </p:tnLst>
   </p:timing>
 </p:sld>
 </file>

</xml_diff>